<commit_message>
adding some books; adding notes in lecture pdf
</commit_message>
<xml_diff>
--- a/lecture/6-Clustering.pptx
+++ b/lecture/6-Clustering.pptx
@@ -180,7 +180,49 @@
       </a:defRPr>
     </a:lvl9pPr>
   </p:defaultTextStyle>
+  <p:extLst>
+    <p:ext uri="{EFAFB233-063F-42B5-8137-9DF3F51BA10A}">
+      <p15:sldGuideLst xmlns:p15="http://schemas.microsoft.com/office/powerpoint/2012/main">
+        <p15:guide id="1" orient="horz" pos="2160">
+          <p15:clr>
+            <a:srgbClr val="A4A3A4"/>
+          </p15:clr>
+        </p15:guide>
+        <p15:guide id="2" pos="2880">
+          <p15:clr>
+            <a:srgbClr val="A4A3A4"/>
+          </p15:clr>
+        </p15:guide>
+      </p15:sldGuideLst>
+    </p:ext>
+  </p:extLst>
 </p:presentation>
+</file>
+
+<file path=ppt/commentAuthors.xml><?xml version="1.0" encoding="utf-8"?>
+<p:cmAuthorLst xmlns:a="http://schemas.openxmlformats.org/drawingml/2006/main" xmlns:r="http://schemas.openxmlformats.org/officeDocument/2006/relationships" xmlns:p="http://schemas.openxmlformats.org/presentationml/2006/main">
+  <p:cmAuthor id="1" name="user" initials="u" lastIdx="2" clrIdx="0">
+    <p:extLst>
+      <p:ext uri="{19B8F6BF-5375-455C-9EA6-DF929625EA0E}">
+        <p15:presenceInfo xmlns:p15="http://schemas.microsoft.com/office/powerpoint/2012/main" userId="user" providerId="None"/>
+      </p:ext>
+    </p:extLst>
+  </p:cmAuthor>
+</p:cmAuthorLst>
+</file>
+
+<file path=ppt/comments/comment1.xml><?xml version="1.0" encoding="utf-8"?>
+<p:cmLst xmlns:a="http://schemas.openxmlformats.org/drawingml/2006/main" xmlns:r="http://schemas.openxmlformats.org/officeDocument/2006/relationships" xmlns:p="http://schemas.openxmlformats.org/presentationml/2006/main">
+  <p:cm authorId="1" dt="2016-12-13T15:32:55.969" idx="1">
+    <p:pos x="1851" y="1501"/>
+    <p:text>可以理解为“距离”</p:text>
+    <p:extLst>
+      <p:ext uri="{C676402C-5697-4E1C-873F-D02D1690AC5C}">
+        <p15:threadingInfo xmlns:p15="http://schemas.microsoft.com/office/powerpoint/2012/main" timeZoneBias="-480"/>
+      </p:ext>
+    </p:extLst>
+  </p:cm>
+</p:cmLst>
 </file>
 
 <file path=ppt/notesMasters/notesMaster1.xml><?xml version="1.0" encoding="utf-8"?>
@@ -274,7 +316,7 @@
               <a:pPr>
                 <a:defRPr/>
               </a:pPr>
-              <a:t>2016/6/16</a:t>
+              <a:t>2016/12/14</a:t>
             </a:fld>
             <a:endParaRPr lang="zh-CN" altLang="en-US"/>
           </a:p>
@@ -627,6 +669,230 @@
           <a:bodyPr/>
           <a:lstStyle/>
           <a:p>
+            <a:r>
+              <a:rPr lang="zh-CN" altLang="en-US" dirty="0" smtClean="0"/>
+              <a:t>坐标变换可能影响到聚类的结果</a:t>
+            </a:r>
+            <a:endParaRPr lang="en-US" altLang="zh-CN" dirty="0" smtClean="0"/>
+          </a:p>
+          <a:p>
+            <a:endParaRPr lang="zh-CN" altLang="en-US" dirty="0"/>
+          </a:p>
+        </p:txBody>
+      </p:sp>
+      <p:sp>
+        <p:nvSpPr>
+          <p:cNvPr id="4" name="灯片编号占位符 3"/>
+          <p:cNvSpPr>
+            <a:spLocks noGrp="1"/>
+          </p:cNvSpPr>
+          <p:nvPr>
+            <p:ph type="sldNum" sz="quarter" idx="10"/>
+          </p:nvPr>
+        </p:nvSpPr>
+        <p:spPr/>
+        <p:txBody>
+          <a:bodyPr/>
+          <a:lstStyle/>
+          <a:p>
+            <a:pPr>
+              <a:defRPr/>
+            </a:pPr>
+            <a:fld id="{0486AD57-67ED-4140-9F70-67C055736CF8}" type="slidenum">
+              <a:rPr lang="zh-CN" altLang="en-US" smtClean="0"/>
+              <a:pPr>
+                <a:defRPr/>
+              </a:pPr>
+              <a:t>11</a:t>
+            </a:fld>
+            <a:endParaRPr lang="zh-CN" altLang="en-US"/>
+          </a:p>
+        </p:txBody>
+      </p:sp>
+    </p:spTree>
+    <p:extLst>
+      <p:ext uri="{BB962C8B-B14F-4D97-AF65-F5344CB8AC3E}">
+        <p14:creationId xmlns:p14="http://schemas.microsoft.com/office/powerpoint/2010/main" val="2188587882"/>
+      </p:ext>
+    </p:extLst>
+  </p:cSld>
+  <p:clrMapOvr>
+    <a:masterClrMapping/>
+  </p:clrMapOvr>
+</p:notes>
+</file>
+
+<file path=ppt/notesSlides/notesSlide10.xml><?xml version="1.0" encoding="utf-8"?>
+<p:notes xmlns:a="http://schemas.openxmlformats.org/drawingml/2006/main" xmlns:r="http://schemas.openxmlformats.org/officeDocument/2006/relationships" xmlns:p="http://schemas.openxmlformats.org/presentationml/2006/main">
+  <p:cSld>
+    <p:spTree>
+      <p:nvGrpSpPr>
+        <p:cNvPr id="1" name=""/>
+        <p:cNvGrpSpPr/>
+        <p:nvPr/>
+      </p:nvGrpSpPr>
+      <p:grpSpPr>
+        <a:xfrm>
+          <a:off x="0" y="0"/>
+          <a:ext cx="0" cy="0"/>
+          <a:chOff x="0" y="0"/>
+          <a:chExt cx="0" cy="0"/>
+        </a:xfrm>
+      </p:grpSpPr>
+      <p:sp>
+        <p:nvSpPr>
+          <p:cNvPr id="2" name="幻灯片图像占位符 1"/>
+          <p:cNvSpPr>
+            <a:spLocks noGrp="1" noRot="1" noChangeAspect="1"/>
+          </p:cNvSpPr>
+          <p:nvPr>
+            <p:ph type="sldImg"/>
+          </p:nvPr>
+        </p:nvSpPr>
+        <p:spPr/>
+      </p:sp>
+      <p:sp>
+        <p:nvSpPr>
+          <p:cNvPr id="3" name="备注占位符 2"/>
+          <p:cNvSpPr>
+            <a:spLocks noGrp="1"/>
+          </p:cNvSpPr>
+          <p:nvPr>
+            <p:ph type="body" idx="1"/>
+          </p:nvPr>
+        </p:nvSpPr>
+        <p:spPr/>
+        <p:txBody>
+          <a:bodyPr/>
+          <a:lstStyle/>
+          <a:p>
+            <a:r>
+              <a:rPr lang="en-US" altLang="zh-CN" dirty="0" smtClean="0"/>
+              <a:t>Z</a:t>
+            </a:r>
+            <a:r>
+              <a:rPr lang="zh-CN" altLang="en-US" dirty="0" smtClean="0"/>
+              <a:t>描述的是每个样本点属于那一个</a:t>
+            </a:r>
+            <a:r>
+              <a:rPr lang="en-US" altLang="zh-CN" dirty="0" smtClean="0"/>
+              <a:t>cluster</a:t>
+            </a:r>
+          </a:p>
+          <a:p>
+            <a:r>
+              <a:rPr lang="zh-CN" altLang="en-US" dirty="0" smtClean="0"/>
+              <a:t>由</a:t>
+            </a:r>
+            <a:r>
+              <a:rPr lang="en-US" altLang="zh-CN" dirty="0" smtClean="0"/>
+              <a:t>Z</a:t>
+            </a:r>
+            <a:r>
+              <a:rPr lang="zh-CN" altLang="en-US" dirty="0" smtClean="0"/>
+              <a:t>，可以将同一个</a:t>
+            </a:r>
+            <a:r>
+              <a:rPr lang="en-US" altLang="zh-CN" dirty="0" smtClean="0"/>
+              <a:t>cluster</a:t>
+            </a:r>
+            <a:r>
+              <a:rPr lang="zh-CN" altLang="en-US" dirty="0" smtClean="0"/>
+              <a:t>的点计算均值，就可以得到上面的模型参数</a:t>
+            </a:r>
+            <a:endParaRPr lang="en-US" altLang="zh-CN" dirty="0" smtClean="0"/>
+          </a:p>
+          <a:p>
+            <a:endParaRPr lang="zh-CN" altLang="en-US" dirty="0"/>
+          </a:p>
+        </p:txBody>
+      </p:sp>
+      <p:sp>
+        <p:nvSpPr>
+          <p:cNvPr id="4" name="灯片编号占位符 3"/>
+          <p:cNvSpPr>
+            <a:spLocks noGrp="1"/>
+          </p:cNvSpPr>
+          <p:nvPr>
+            <p:ph type="sldNum" sz="quarter" idx="10"/>
+          </p:nvPr>
+        </p:nvSpPr>
+        <p:spPr/>
+        <p:txBody>
+          <a:bodyPr/>
+          <a:lstStyle/>
+          <a:p>
+            <a:pPr>
+              <a:defRPr/>
+            </a:pPr>
+            <a:fld id="{0486AD57-67ED-4140-9F70-67C055736CF8}" type="slidenum">
+              <a:rPr lang="zh-CN" altLang="en-US" smtClean="0"/>
+              <a:pPr>
+                <a:defRPr/>
+              </a:pPr>
+              <a:t>29</a:t>
+            </a:fld>
+            <a:endParaRPr lang="zh-CN" altLang="en-US"/>
+          </a:p>
+        </p:txBody>
+      </p:sp>
+    </p:spTree>
+    <p:extLst>
+      <p:ext uri="{BB962C8B-B14F-4D97-AF65-F5344CB8AC3E}">
+        <p14:creationId xmlns:p14="http://schemas.microsoft.com/office/powerpoint/2010/main" val="3494261830"/>
+      </p:ext>
+    </p:extLst>
+  </p:cSld>
+  <p:clrMapOvr>
+    <a:masterClrMapping/>
+  </p:clrMapOvr>
+</p:notes>
+</file>
+
+<file path=ppt/notesSlides/notesSlide11.xml><?xml version="1.0" encoding="utf-8"?>
+<p:notes xmlns:a="http://schemas.openxmlformats.org/drawingml/2006/main" xmlns:r="http://schemas.openxmlformats.org/officeDocument/2006/relationships" xmlns:p="http://schemas.openxmlformats.org/presentationml/2006/main">
+  <p:cSld>
+    <p:spTree>
+      <p:nvGrpSpPr>
+        <p:cNvPr id="1" name=""/>
+        <p:cNvGrpSpPr/>
+        <p:nvPr/>
+      </p:nvGrpSpPr>
+      <p:grpSpPr>
+        <a:xfrm>
+          <a:off x="0" y="0"/>
+          <a:ext cx="0" cy="0"/>
+          <a:chOff x="0" y="0"/>
+          <a:chExt cx="0" cy="0"/>
+        </a:xfrm>
+      </p:grpSpPr>
+      <p:sp>
+        <p:nvSpPr>
+          <p:cNvPr id="2" name="幻灯片图像占位符 1"/>
+          <p:cNvSpPr>
+            <a:spLocks noGrp="1" noRot="1" noChangeAspect="1"/>
+          </p:cNvSpPr>
+          <p:nvPr>
+            <p:ph type="sldImg"/>
+          </p:nvPr>
+        </p:nvSpPr>
+        <p:spPr/>
+      </p:sp>
+      <p:sp>
+        <p:nvSpPr>
+          <p:cNvPr id="3" name="备注占位符 2"/>
+          <p:cNvSpPr>
+            <a:spLocks noGrp="1"/>
+          </p:cNvSpPr>
+          <p:nvPr>
+            <p:ph type="body" idx="1"/>
+          </p:nvPr>
+        </p:nvSpPr>
+        <p:spPr/>
+        <p:txBody>
+          <a:bodyPr/>
+          <a:lstStyle/>
+          <a:p>
             <a:pPr marL="0" marR="0" indent="0" algn="l" defTabSz="914400" rtl="0" eaLnBrk="0" fontAlgn="base" latinLnBrk="0" hangingPunct="0">
               <a:lnSpc>
                 <a:spcPct val="100000"/>
@@ -694,6 +960,1000 @@
     <p:extLst>
       <p:ext uri="{BB962C8B-B14F-4D97-AF65-F5344CB8AC3E}">
         <p14:creationId xmlns:p14="http://schemas.microsoft.com/office/powerpoint/2010/main" val="13227771"/>
+      </p:ext>
+    </p:extLst>
+  </p:cSld>
+  <p:clrMapOvr>
+    <a:masterClrMapping/>
+  </p:clrMapOvr>
+</p:notes>
+</file>
+
+<file path=ppt/notesSlides/notesSlide12.xml><?xml version="1.0" encoding="utf-8"?>
+<p:notes xmlns:a="http://schemas.openxmlformats.org/drawingml/2006/main" xmlns:r="http://schemas.openxmlformats.org/officeDocument/2006/relationships" xmlns:p="http://schemas.openxmlformats.org/presentationml/2006/main">
+  <p:cSld>
+    <p:spTree>
+      <p:nvGrpSpPr>
+        <p:cNvPr id="1" name=""/>
+        <p:cNvGrpSpPr/>
+        <p:nvPr/>
+      </p:nvGrpSpPr>
+      <p:grpSpPr>
+        <a:xfrm>
+          <a:off x="0" y="0"/>
+          <a:ext cx="0" cy="0"/>
+          <a:chOff x="0" y="0"/>
+          <a:chExt cx="0" cy="0"/>
+        </a:xfrm>
+      </p:grpSpPr>
+      <p:sp>
+        <p:nvSpPr>
+          <p:cNvPr id="2" name="幻灯片图像占位符 1"/>
+          <p:cNvSpPr>
+            <a:spLocks noGrp="1" noRot="1" noChangeAspect="1"/>
+          </p:cNvSpPr>
+          <p:nvPr>
+            <p:ph type="sldImg"/>
+          </p:nvPr>
+        </p:nvSpPr>
+        <p:spPr/>
+      </p:sp>
+      <p:sp>
+        <p:nvSpPr>
+          <p:cNvPr id="3" name="备注占位符 2"/>
+          <p:cNvSpPr>
+            <a:spLocks noGrp="1"/>
+          </p:cNvSpPr>
+          <p:nvPr>
+            <p:ph type="body" idx="1"/>
+          </p:nvPr>
+        </p:nvSpPr>
+        <p:spPr/>
+        <p:txBody>
+          <a:bodyPr/>
+          <a:lstStyle/>
+          <a:p>
+            <a:r>
+              <a:rPr lang="en-US" altLang="zh-CN" dirty="0" err="1" smtClean="0"/>
+              <a:t>Miu</a:t>
+            </a:r>
+            <a:r>
+              <a:rPr lang="zh-CN" altLang="en-US" dirty="0" smtClean="0"/>
+              <a:t>：高斯的均值</a:t>
+            </a:r>
+            <a:endParaRPr lang="en-US" altLang="zh-CN" dirty="0" smtClean="0"/>
+          </a:p>
+          <a:p>
+            <a:r>
+              <a:rPr lang="en-US" altLang="zh-CN" dirty="0" smtClean="0"/>
+              <a:t>Alfa</a:t>
+            </a:r>
+            <a:r>
+              <a:rPr lang="zh-CN" altLang="en-US" dirty="0" smtClean="0"/>
+              <a:t>：权重</a:t>
+            </a:r>
+            <a:endParaRPr lang="en-US" altLang="zh-CN" dirty="0" smtClean="0"/>
+          </a:p>
+          <a:p>
+            <a:endParaRPr lang="en-US" altLang="zh-CN" dirty="0" smtClean="0"/>
+          </a:p>
+          <a:p>
+            <a:r>
+              <a:rPr lang="zh-CN" altLang="en-US" dirty="0" smtClean="0"/>
+              <a:t>算法开始时，随机生成一些</a:t>
+            </a:r>
+            <a:r>
+              <a:rPr lang="en-US" altLang="zh-CN" dirty="0" smtClean="0"/>
+              <a:t>Alfa</a:t>
+            </a:r>
+            <a:r>
+              <a:rPr lang="zh-CN" altLang="en-US" dirty="0" smtClean="0"/>
+              <a:t>和</a:t>
+            </a:r>
+            <a:r>
+              <a:rPr lang="en-US" altLang="zh-CN" dirty="0" err="1" smtClean="0"/>
+              <a:t>miu</a:t>
+            </a:r>
+            <a:r>
+              <a:rPr lang="en-US" altLang="zh-CN" dirty="0" smtClean="0"/>
+              <a:t> </a:t>
+            </a:r>
+            <a:r>
+              <a:rPr lang="en-US" altLang="zh-CN" dirty="0" smtClean="0">
+                <a:sym typeface="Wingdings" panose="05000000000000000000" pitchFamily="2" charset="2"/>
+              </a:rPr>
+              <a:t> </a:t>
+            </a:r>
+            <a:r>
+              <a:rPr lang="zh-CN" altLang="en-US" dirty="0" smtClean="0">
+                <a:sym typeface="Wingdings" panose="05000000000000000000" pitchFamily="2" charset="2"/>
+              </a:rPr>
+              <a:t>算出每个样本点是由某个高斯生成的概率</a:t>
+            </a:r>
+            <a:r>
+              <a:rPr lang="en-US" altLang="zh-CN" dirty="0" smtClean="0">
+                <a:sym typeface="Wingdings" panose="05000000000000000000" pitchFamily="2" charset="2"/>
+              </a:rPr>
+              <a:t>E</a:t>
+            </a:r>
+            <a:r>
+              <a:rPr lang="zh-CN" altLang="en-US" dirty="0" smtClean="0">
+                <a:sym typeface="Wingdings" panose="05000000000000000000" pitchFamily="2" charset="2"/>
+              </a:rPr>
+              <a:t>（</a:t>
+            </a:r>
+            <a:r>
+              <a:rPr lang="en-US" altLang="zh-CN" dirty="0" err="1" smtClean="0">
+                <a:sym typeface="Wingdings" panose="05000000000000000000" pitchFamily="2" charset="2"/>
+              </a:rPr>
+              <a:t>Zij</a:t>
+            </a:r>
+            <a:r>
+              <a:rPr lang="zh-CN" altLang="en-US" dirty="0" smtClean="0">
+                <a:sym typeface="Wingdings" panose="05000000000000000000" pitchFamily="2" charset="2"/>
+              </a:rPr>
+              <a:t>）</a:t>
+            </a:r>
+            <a:r>
+              <a:rPr lang="en-US" altLang="zh-CN" dirty="0" smtClean="0">
+                <a:sym typeface="Wingdings" panose="05000000000000000000" pitchFamily="2" charset="2"/>
+              </a:rPr>
+              <a:t> </a:t>
+            </a:r>
+            <a:r>
+              <a:rPr lang="zh-CN" altLang="en-US" dirty="0" smtClean="0">
+                <a:sym typeface="Wingdings" panose="05000000000000000000" pitchFamily="2" charset="2"/>
+              </a:rPr>
+              <a:t>计算新的</a:t>
+            </a:r>
+            <a:r>
+              <a:rPr lang="en-US" altLang="zh-CN" dirty="0" smtClean="0">
+                <a:sym typeface="Wingdings" panose="05000000000000000000" pitchFamily="2" charset="2"/>
+              </a:rPr>
+              <a:t>Alfa</a:t>
+            </a:r>
+            <a:r>
+              <a:rPr lang="zh-CN" altLang="en-US" dirty="0" smtClean="0">
+                <a:sym typeface="Wingdings" panose="05000000000000000000" pitchFamily="2" charset="2"/>
+              </a:rPr>
+              <a:t>和</a:t>
+            </a:r>
+            <a:r>
+              <a:rPr lang="en-US" altLang="zh-CN" dirty="0" err="1" smtClean="0">
+                <a:sym typeface="Wingdings" panose="05000000000000000000" pitchFamily="2" charset="2"/>
+              </a:rPr>
+              <a:t>miu</a:t>
+            </a:r>
+            <a:endParaRPr lang="en-US" altLang="zh-CN" dirty="0" smtClean="0">
+              <a:sym typeface="Wingdings" panose="05000000000000000000" pitchFamily="2" charset="2"/>
+            </a:endParaRPr>
+          </a:p>
+          <a:p>
+            <a:endParaRPr lang="en-US" altLang="zh-CN" dirty="0" smtClean="0">
+              <a:sym typeface="Wingdings" panose="05000000000000000000" pitchFamily="2" charset="2"/>
+            </a:endParaRPr>
+          </a:p>
+          <a:p>
+            <a:r>
+              <a:rPr lang="zh-CN" altLang="en-US" dirty="0" smtClean="0">
+                <a:sym typeface="Wingdings" panose="05000000000000000000" pitchFamily="2" charset="2"/>
+              </a:rPr>
+              <a:t>不断迭代</a:t>
+            </a:r>
+            <a:r>
+              <a:rPr lang="en-US" altLang="zh-CN" dirty="0" smtClean="0">
+                <a:sym typeface="Wingdings" panose="05000000000000000000" pitchFamily="2" charset="2"/>
+              </a:rPr>
+              <a:t> </a:t>
+            </a:r>
+            <a:endParaRPr lang="en-US" altLang="zh-CN" dirty="0" smtClean="0"/>
+          </a:p>
+        </p:txBody>
+      </p:sp>
+      <p:sp>
+        <p:nvSpPr>
+          <p:cNvPr id="4" name="灯片编号占位符 3"/>
+          <p:cNvSpPr>
+            <a:spLocks noGrp="1"/>
+          </p:cNvSpPr>
+          <p:nvPr>
+            <p:ph type="sldNum" sz="quarter" idx="10"/>
+          </p:nvPr>
+        </p:nvSpPr>
+        <p:spPr/>
+        <p:txBody>
+          <a:bodyPr/>
+          <a:lstStyle/>
+          <a:p>
+            <a:pPr>
+              <a:defRPr/>
+            </a:pPr>
+            <a:fld id="{0486AD57-67ED-4140-9F70-67C055736CF8}" type="slidenum">
+              <a:rPr lang="zh-CN" altLang="en-US" smtClean="0"/>
+              <a:pPr>
+                <a:defRPr/>
+              </a:pPr>
+              <a:t>32</a:t>
+            </a:fld>
+            <a:endParaRPr lang="zh-CN" altLang="en-US"/>
+          </a:p>
+        </p:txBody>
+      </p:sp>
+    </p:spTree>
+    <p:extLst>
+      <p:ext uri="{BB962C8B-B14F-4D97-AF65-F5344CB8AC3E}">
+        <p14:creationId xmlns:p14="http://schemas.microsoft.com/office/powerpoint/2010/main" val="1377007863"/>
+      </p:ext>
+    </p:extLst>
+  </p:cSld>
+  <p:clrMapOvr>
+    <a:masterClrMapping/>
+  </p:clrMapOvr>
+</p:notes>
+</file>
+
+<file path=ppt/notesSlides/notesSlide2.xml><?xml version="1.0" encoding="utf-8"?>
+<p:notes xmlns:a="http://schemas.openxmlformats.org/drawingml/2006/main" xmlns:r="http://schemas.openxmlformats.org/officeDocument/2006/relationships" xmlns:p="http://schemas.openxmlformats.org/presentationml/2006/main">
+  <p:cSld>
+    <p:spTree>
+      <p:nvGrpSpPr>
+        <p:cNvPr id="1" name=""/>
+        <p:cNvGrpSpPr/>
+        <p:nvPr/>
+      </p:nvGrpSpPr>
+      <p:grpSpPr>
+        <a:xfrm>
+          <a:off x="0" y="0"/>
+          <a:ext cx="0" cy="0"/>
+          <a:chOff x="0" y="0"/>
+          <a:chExt cx="0" cy="0"/>
+        </a:xfrm>
+      </p:grpSpPr>
+      <p:sp>
+        <p:nvSpPr>
+          <p:cNvPr id="2" name="幻灯片图像占位符 1"/>
+          <p:cNvSpPr>
+            <a:spLocks noGrp="1" noRot="1" noChangeAspect="1"/>
+          </p:cNvSpPr>
+          <p:nvPr>
+            <p:ph type="sldImg"/>
+          </p:nvPr>
+        </p:nvSpPr>
+        <p:spPr/>
+      </p:sp>
+      <p:sp>
+        <p:nvSpPr>
+          <p:cNvPr id="3" name="备注占位符 2"/>
+          <p:cNvSpPr>
+            <a:spLocks noGrp="1"/>
+          </p:cNvSpPr>
+          <p:nvPr>
+            <p:ph type="body" idx="1"/>
+          </p:nvPr>
+        </p:nvSpPr>
+        <p:spPr/>
+        <p:txBody>
+          <a:bodyPr/>
+          <a:lstStyle/>
+          <a:p>
+            <a:r>
+              <a:rPr lang="zh-CN" altLang="en-US" dirty="0" smtClean="0"/>
+              <a:t>不同的数据预处理方法，可能会直接改变聚类的结果</a:t>
+            </a:r>
+            <a:r>
+              <a:rPr lang="zh-CN" altLang="en-US" baseline="0" dirty="0" smtClean="0"/>
+              <a:t> </a:t>
+            </a:r>
+            <a:r>
+              <a:rPr lang="en-US" altLang="zh-CN" baseline="0" dirty="0" smtClean="0"/>
+              <a:t>--- </a:t>
+            </a:r>
+            <a:r>
+              <a:rPr lang="zh-CN" altLang="en-US" baseline="0" dirty="0" smtClean="0"/>
+              <a:t>要小心</a:t>
+            </a:r>
+            <a:endParaRPr lang="en-US" altLang="zh-CN" baseline="0" dirty="0" smtClean="0"/>
+          </a:p>
+          <a:p>
+            <a:endParaRPr lang="zh-CN" altLang="en-US" dirty="0"/>
+          </a:p>
+        </p:txBody>
+      </p:sp>
+      <p:sp>
+        <p:nvSpPr>
+          <p:cNvPr id="4" name="灯片编号占位符 3"/>
+          <p:cNvSpPr>
+            <a:spLocks noGrp="1"/>
+          </p:cNvSpPr>
+          <p:nvPr>
+            <p:ph type="sldNum" sz="quarter" idx="10"/>
+          </p:nvPr>
+        </p:nvSpPr>
+        <p:spPr/>
+        <p:txBody>
+          <a:bodyPr/>
+          <a:lstStyle/>
+          <a:p>
+            <a:pPr>
+              <a:defRPr/>
+            </a:pPr>
+            <a:fld id="{0486AD57-67ED-4140-9F70-67C055736CF8}" type="slidenum">
+              <a:rPr lang="zh-CN" altLang="en-US" smtClean="0"/>
+              <a:pPr>
+                <a:defRPr/>
+              </a:pPr>
+              <a:t>12</a:t>
+            </a:fld>
+            <a:endParaRPr lang="zh-CN" altLang="en-US"/>
+          </a:p>
+        </p:txBody>
+      </p:sp>
+    </p:spTree>
+    <p:extLst>
+      <p:ext uri="{BB962C8B-B14F-4D97-AF65-F5344CB8AC3E}">
+        <p14:creationId xmlns:p14="http://schemas.microsoft.com/office/powerpoint/2010/main" val="3386086587"/>
+      </p:ext>
+    </p:extLst>
+  </p:cSld>
+  <p:clrMapOvr>
+    <a:masterClrMapping/>
+  </p:clrMapOvr>
+</p:notes>
+</file>
+
+<file path=ppt/notesSlides/notesSlide3.xml><?xml version="1.0" encoding="utf-8"?>
+<p:notes xmlns:a="http://schemas.openxmlformats.org/drawingml/2006/main" xmlns:r="http://schemas.openxmlformats.org/officeDocument/2006/relationships" xmlns:p="http://schemas.openxmlformats.org/presentationml/2006/main">
+  <p:cSld>
+    <p:spTree>
+      <p:nvGrpSpPr>
+        <p:cNvPr id="1" name=""/>
+        <p:cNvGrpSpPr/>
+        <p:nvPr/>
+      </p:nvGrpSpPr>
+      <p:grpSpPr>
+        <a:xfrm>
+          <a:off x="0" y="0"/>
+          <a:ext cx="0" cy="0"/>
+          <a:chOff x="0" y="0"/>
+          <a:chExt cx="0" cy="0"/>
+        </a:xfrm>
+      </p:grpSpPr>
+      <p:sp>
+        <p:nvSpPr>
+          <p:cNvPr id="2" name="幻灯片图像占位符 1"/>
+          <p:cNvSpPr>
+            <a:spLocks noGrp="1" noRot="1" noChangeAspect="1"/>
+          </p:cNvSpPr>
+          <p:nvPr>
+            <p:ph type="sldImg"/>
+          </p:nvPr>
+        </p:nvSpPr>
+        <p:spPr/>
+      </p:sp>
+      <p:sp>
+        <p:nvSpPr>
+          <p:cNvPr id="3" name="备注占位符 2"/>
+          <p:cNvSpPr>
+            <a:spLocks noGrp="1"/>
+          </p:cNvSpPr>
+          <p:nvPr>
+            <p:ph type="body" idx="1"/>
+          </p:nvPr>
+        </p:nvSpPr>
+        <p:spPr/>
+        <p:txBody>
+          <a:bodyPr/>
+          <a:lstStyle/>
+          <a:p>
+            <a:endParaRPr lang="zh-CN" altLang="en-US" dirty="0"/>
+          </a:p>
+        </p:txBody>
+      </p:sp>
+      <p:sp>
+        <p:nvSpPr>
+          <p:cNvPr id="4" name="灯片编号占位符 3"/>
+          <p:cNvSpPr>
+            <a:spLocks noGrp="1"/>
+          </p:cNvSpPr>
+          <p:nvPr>
+            <p:ph type="sldNum" sz="quarter" idx="10"/>
+          </p:nvPr>
+        </p:nvSpPr>
+        <p:spPr/>
+        <p:txBody>
+          <a:bodyPr/>
+          <a:lstStyle/>
+          <a:p>
+            <a:pPr>
+              <a:defRPr/>
+            </a:pPr>
+            <a:fld id="{0486AD57-67ED-4140-9F70-67C055736CF8}" type="slidenum">
+              <a:rPr lang="zh-CN" altLang="en-US" smtClean="0"/>
+              <a:pPr>
+                <a:defRPr/>
+              </a:pPr>
+              <a:t>14</a:t>
+            </a:fld>
+            <a:endParaRPr lang="zh-CN" altLang="en-US"/>
+          </a:p>
+        </p:txBody>
+      </p:sp>
+    </p:spTree>
+    <p:extLst>
+      <p:ext uri="{BB962C8B-B14F-4D97-AF65-F5344CB8AC3E}">
+        <p14:creationId xmlns:p14="http://schemas.microsoft.com/office/powerpoint/2010/main" val="863245641"/>
+      </p:ext>
+    </p:extLst>
+  </p:cSld>
+  <p:clrMapOvr>
+    <a:masterClrMapping/>
+  </p:clrMapOvr>
+</p:notes>
+</file>
+
+<file path=ppt/notesSlides/notesSlide4.xml><?xml version="1.0" encoding="utf-8"?>
+<p:notes xmlns:a="http://schemas.openxmlformats.org/drawingml/2006/main" xmlns:r="http://schemas.openxmlformats.org/officeDocument/2006/relationships" xmlns:p="http://schemas.openxmlformats.org/presentationml/2006/main">
+  <p:cSld>
+    <p:spTree>
+      <p:nvGrpSpPr>
+        <p:cNvPr id="1" name=""/>
+        <p:cNvGrpSpPr/>
+        <p:nvPr/>
+      </p:nvGrpSpPr>
+      <p:grpSpPr>
+        <a:xfrm>
+          <a:off x="0" y="0"/>
+          <a:ext cx="0" cy="0"/>
+          <a:chOff x="0" y="0"/>
+          <a:chExt cx="0" cy="0"/>
+        </a:xfrm>
+      </p:grpSpPr>
+      <p:sp>
+        <p:nvSpPr>
+          <p:cNvPr id="2" name="幻灯片图像占位符 1"/>
+          <p:cNvSpPr>
+            <a:spLocks noGrp="1" noRot="1" noChangeAspect="1"/>
+          </p:cNvSpPr>
+          <p:nvPr>
+            <p:ph type="sldImg"/>
+          </p:nvPr>
+        </p:nvSpPr>
+        <p:spPr/>
+      </p:sp>
+      <p:sp>
+        <p:nvSpPr>
+          <p:cNvPr id="3" name="备注占位符 2"/>
+          <p:cNvSpPr>
+            <a:spLocks noGrp="1"/>
+          </p:cNvSpPr>
+          <p:nvPr>
+            <p:ph type="body" idx="1"/>
+          </p:nvPr>
+        </p:nvSpPr>
+        <p:spPr/>
+        <p:txBody>
+          <a:bodyPr/>
+          <a:lstStyle/>
+          <a:p>
+            <a:endParaRPr lang="zh-CN" altLang="en-US" dirty="0"/>
+          </a:p>
+        </p:txBody>
+      </p:sp>
+      <p:sp>
+        <p:nvSpPr>
+          <p:cNvPr id="4" name="灯片编号占位符 3"/>
+          <p:cNvSpPr>
+            <a:spLocks noGrp="1"/>
+          </p:cNvSpPr>
+          <p:nvPr>
+            <p:ph type="sldNum" sz="quarter" idx="10"/>
+          </p:nvPr>
+        </p:nvSpPr>
+        <p:spPr/>
+        <p:txBody>
+          <a:bodyPr/>
+          <a:lstStyle/>
+          <a:p>
+            <a:pPr>
+              <a:defRPr/>
+            </a:pPr>
+            <a:fld id="{0486AD57-67ED-4140-9F70-67C055736CF8}" type="slidenum">
+              <a:rPr lang="zh-CN" altLang="en-US" smtClean="0"/>
+              <a:pPr>
+                <a:defRPr/>
+              </a:pPr>
+              <a:t>16</a:t>
+            </a:fld>
+            <a:endParaRPr lang="zh-CN" altLang="en-US"/>
+          </a:p>
+        </p:txBody>
+      </p:sp>
+    </p:spTree>
+    <p:extLst>
+      <p:ext uri="{BB962C8B-B14F-4D97-AF65-F5344CB8AC3E}">
+        <p14:creationId xmlns:p14="http://schemas.microsoft.com/office/powerpoint/2010/main" val="1582895585"/>
+      </p:ext>
+    </p:extLst>
+  </p:cSld>
+  <p:clrMapOvr>
+    <a:masterClrMapping/>
+  </p:clrMapOvr>
+</p:notes>
+</file>
+
+<file path=ppt/notesSlides/notesSlide5.xml><?xml version="1.0" encoding="utf-8"?>
+<p:notes xmlns:a="http://schemas.openxmlformats.org/drawingml/2006/main" xmlns:r="http://schemas.openxmlformats.org/officeDocument/2006/relationships" xmlns:p="http://schemas.openxmlformats.org/presentationml/2006/main">
+  <p:cSld>
+    <p:spTree>
+      <p:nvGrpSpPr>
+        <p:cNvPr id="1" name=""/>
+        <p:cNvGrpSpPr/>
+        <p:nvPr/>
+      </p:nvGrpSpPr>
+      <p:grpSpPr>
+        <a:xfrm>
+          <a:off x="0" y="0"/>
+          <a:ext cx="0" cy="0"/>
+          <a:chOff x="0" y="0"/>
+          <a:chExt cx="0" cy="0"/>
+        </a:xfrm>
+      </p:grpSpPr>
+      <p:sp>
+        <p:nvSpPr>
+          <p:cNvPr id="2" name="幻灯片图像占位符 1"/>
+          <p:cNvSpPr>
+            <a:spLocks noGrp="1" noRot="1" noChangeAspect="1"/>
+          </p:cNvSpPr>
+          <p:nvPr>
+            <p:ph type="sldImg"/>
+          </p:nvPr>
+        </p:nvSpPr>
+        <p:spPr/>
+      </p:sp>
+      <p:sp>
+        <p:nvSpPr>
+          <p:cNvPr id="3" name="备注占位符 2"/>
+          <p:cNvSpPr>
+            <a:spLocks noGrp="1"/>
+          </p:cNvSpPr>
+          <p:nvPr>
+            <p:ph type="body" idx="1"/>
+          </p:nvPr>
+        </p:nvSpPr>
+        <p:spPr/>
+        <p:txBody>
+          <a:bodyPr/>
+          <a:lstStyle/>
+          <a:p>
+            <a:r>
+              <a:rPr lang="zh-CN" altLang="en-US" dirty="0" smtClean="0"/>
+              <a:t>上面那一块对应下面比较松散的那一块</a:t>
+            </a:r>
+            <a:endParaRPr lang="en-US" altLang="zh-CN" dirty="0" smtClean="0"/>
+          </a:p>
+          <a:p>
+            <a:r>
+              <a:rPr lang="zh-CN" altLang="en-US" dirty="0" smtClean="0"/>
+              <a:t>下面那一块对应上面比较集中的那一块</a:t>
+            </a:r>
+            <a:endParaRPr lang="zh-CN" altLang="en-US" dirty="0"/>
+          </a:p>
+        </p:txBody>
+      </p:sp>
+      <p:sp>
+        <p:nvSpPr>
+          <p:cNvPr id="4" name="灯片编号占位符 3"/>
+          <p:cNvSpPr>
+            <a:spLocks noGrp="1"/>
+          </p:cNvSpPr>
+          <p:nvPr>
+            <p:ph type="sldNum" sz="quarter" idx="10"/>
+          </p:nvPr>
+        </p:nvSpPr>
+        <p:spPr/>
+        <p:txBody>
+          <a:bodyPr/>
+          <a:lstStyle/>
+          <a:p>
+            <a:pPr>
+              <a:defRPr/>
+            </a:pPr>
+            <a:fld id="{0486AD57-67ED-4140-9F70-67C055736CF8}" type="slidenum">
+              <a:rPr lang="zh-CN" altLang="en-US" smtClean="0"/>
+              <a:pPr>
+                <a:defRPr/>
+              </a:pPr>
+              <a:t>17</a:t>
+            </a:fld>
+            <a:endParaRPr lang="zh-CN" altLang="en-US"/>
+          </a:p>
+        </p:txBody>
+      </p:sp>
+    </p:spTree>
+    <p:extLst>
+      <p:ext uri="{BB962C8B-B14F-4D97-AF65-F5344CB8AC3E}">
+        <p14:creationId xmlns:p14="http://schemas.microsoft.com/office/powerpoint/2010/main" val="2158073309"/>
+      </p:ext>
+    </p:extLst>
+  </p:cSld>
+  <p:clrMapOvr>
+    <a:masterClrMapping/>
+  </p:clrMapOvr>
+</p:notes>
+</file>
+
+<file path=ppt/notesSlides/notesSlide6.xml><?xml version="1.0" encoding="utf-8"?>
+<p:notes xmlns:a="http://schemas.openxmlformats.org/drawingml/2006/main" xmlns:r="http://schemas.openxmlformats.org/officeDocument/2006/relationships" xmlns:p="http://schemas.openxmlformats.org/presentationml/2006/main">
+  <p:cSld>
+    <p:spTree>
+      <p:nvGrpSpPr>
+        <p:cNvPr id="1" name=""/>
+        <p:cNvGrpSpPr/>
+        <p:nvPr/>
+      </p:nvGrpSpPr>
+      <p:grpSpPr>
+        <a:xfrm>
+          <a:off x="0" y="0"/>
+          <a:ext cx="0" cy="0"/>
+          <a:chOff x="0" y="0"/>
+          <a:chExt cx="0" cy="0"/>
+        </a:xfrm>
+      </p:grpSpPr>
+      <p:sp>
+        <p:nvSpPr>
+          <p:cNvPr id="2" name="幻灯片图像占位符 1"/>
+          <p:cNvSpPr>
+            <a:spLocks noGrp="1" noRot="1" noChangeAspect="1"/>
+          </p:cNvSpPr>
+          <p:nvPr>
+            <p:ph type="sldImg"/>
+          </p:nvPr>
+        </p:nvSpPr>
+        <p:spPr/>
+      </p:sp>
+      <p:sp>
+        <p:nvSpPr>
+          <p:cNvPr id="3" name="备注占位符 2"/>
+          <p:cNvSpPr>
+            <a:spLocks noGrp="1"/>
+          </p:cNvSpPr>
+          <p:nvPr>
+            <p:ph type="body" idx="1"/>
+          </p:nvPr>
+        </p:nvSpPr>
+        <p:spPr/>
+        <p:txBody>
+          <a:bodyPr/>
+          <a:lstStyle/>
+          <a:p>
+            <a:endParaRPr lang="zh-CN" altLang="en-US" dirty="0"/>
+          </a:p>
+        </p:txBody>
+      </p:sp>
+      <p:sp>
+        <p:nvSpPr>
+          <p:cNvPr id="4" name="灯片编号占位符 3"/>
+          <p:cNvSpPr>
+            <a:spLocks noGrp="1"/>
+          </p:cNvSpPr>
+          <p:nvPr>
+            <p:ph type="sldNum" sz="quarter" idx="10"/>
+          </p:nvPr>
+        </p:nvSpPr>
+        <p:spPr/>
+        <p:txBody>
+          <a:bodyPr/>
+          <a:lstStyle/>
+          <a:p>
+            <a:pPr>
+              <a:defRPr/>
+            </a:pPr>
+            <a:fld id="{0486AD57-67ED-4140-9F70-67C055736CF8}" type="slidenum">
+              <a:rPr lang="zh-CN" altLang="en-US" smtClean="0"/>
+              <a:pPr>
+                <a:defRPr/>
+              </a:pPr>
+              <a:t>19</a:t>
+            </a:fld>
+            <a:endParaRPr lang="zh-CN" altLang="en-US"/>
+          </a:p>
+        </p:txBody>
+      </p:sp>
+    </p:spTree>
+    <p:extLst>
+      <p:ext uri="{BB962C8B-B14F-4D97-AF65-F5344CB8AC3E}">
+        <p14:creationId xmlns:p14="http://schemas.microsoft.com/office/powerpoint/2010/main" val="3582995952"/>
+      </p:ext>
+    </p:extLst>
+  </p:cSld>
+  <p:clrMapOvr>
+    <a:masterClrMapping/>
+  </p:clrMapOvr>
+</p:notes>
+</file>
+
+<file path=ppt/notesSlides/notesSlide7.xml><?xml version="1.0" encoding="utf-8"?>
+<p:notes xmlns:a="http://schemas.openxmlformats.org/drawingml/2006/main" xmlns:r="http://schemas.openxmlformats.org/officeDocument/2006/relationships" xmlns:p="http://schemas.openxmlformats.org/presentationml/2006/main">
+  <p:cSld>
+    <p:spTree>
+      <p:nvGrpSpPr>
+        <p:cNvPr id="1" name=""/>
+        <p:cNvGrpSpPr/>
+        <p:nvPr/>
+      </p:nvGrpSpPr>
+      <p:grpSpPr>
+        <a:xfrm>
+          <a:off x="0" y="0"/>
+          <a:ext cx="0" cy="0"/>
+          <a:chOff x="0" y="0"/>
+          <a:chExt cx="0" cy="0"/>
+        </a:xfrm>
+      </p:grpSpPr>
+      <p:sp>
+        <p:nvSpPr>
+          <p:cNvPr id="2" name="幻灯片图像占位符 1"/>
+          <p:cNvSpPr>
+            <a:spLocks noGrp="1" noRot="1" noChangeAspect="1"/>
+          </p:cNvSpPr>
+          <p:nvPr>
+            <p:ph type="sldImg"/>
+          </p:nvPr>
+        </p:nvSpPr>
+        <p:spPr/>
+      </p:sp>
+      <p:sp>
+        <p:nvSpPr>
+          <p:cNvPr id="3" name="备注占位符 2"/>
+          <p:cNvSpPr>
+            <a:spLocks noGrp="1"/>
+          </p:cNvSpPr>
+          <p:nvPr>
+            <p:ph type="body" idx="1"/>
+          </p:nvPr>
+        </p:nvSpPr>
+        <p:spPr/>
+        <p:txBody>
+          <a:bodyPr/>
+          <a:lstStyle/>
+          <a:p>
+            <a:r>
+              <a:rPr lang="zh-CN" altLang="en-US" dirty="0" smtClean="0"/>
+              <a:t>初始点选得不好，可能会影响结果，需要多试几次</a:t>
+            </a:r>
+            <a:endParaRPr lang="en-US" altLang="zh-CN" dirty="0" smtClean="0"/>
+          </a:p>
+          <a:p>
+            <a:endParaRPr lang="zh-CN" altLang="en-US" dirty="0"/>
+          </a:p>
+        </p:txBody>
+      </p:sp>
+      <p:sp>
+        <p:nvSpPr>
+          <p:cNvPr id="4" name="灯片编号占位符 3"/>
+          <p:cNvSpPr>
+            <a:spLocks noGrp="1"/>
+          </p:cNvSpPr>
+          <p:nvPr>
+            <p:ph type="sldNum" sz="quarter" idx="10"/>
+          </p:nvPr>
+        </p:nvSpPr>
+        <p:spPr/>
+        <p:txBody>
+          <a:bodyPr/>
+          <a:lstStyle/>
+          <a:p>
+            <a:pPr>
+              <a:defRPr/>
+            </a:pPr>
+            <a:fld id="{0486AD57-67ED-4140-9F70-67C055736CF8}" type="slidenum">
+              <a:rPr lang="zh-CN" altLang="en-US" smtClean="0"/>
+              <a:pPr>
+                <a:defRPr/>
+              </a:pPr>
+              <a:t>24</a:t>
+            </a:fld>
+            <a:endParaRPr lang="zh-CN" altLang="en-US"/>
+          </a:p>
+        </p:txBody>
+      </p:sp>
+    </p:spTree>
+    <p:extLst>
+      <p:ext uri="{BB962C8B-B14F-4D97-AF65-F5344CB8AC3E}">
+        <p14:creationId xmlns:p14="http://schemas.microsoft.com/office/powerpoint/2010/main" val="805219231"/>
+      </p:ext>
+    </p:extLst>
+  </p:cSld>
+  <p:clrMapOvr>
+    <a:masterClrMapping/>
+  </p:clrMapOvr>
+</p:notes>
+</file>
+
+<file path=ppt/notesSlides/notesSlide8.xml><?xml version="1.0" encoding="utf-8"?>
+<p:notes xmlns:a="http://schemas.openxmlformats.org/drawingml/2006/main" xmlns:r="http://schemas.openxmlformats.org/officeDocument/2006/relationships" xmlns:p="http://schemas.openxmlformats.org/presentationml/2006/main">
+  <p:cSld>
+    <p:spTree>
+      <p:nvGrpSpPr>
+        <p:cNvPr id="1" name=""/>
+        <p:cNvGrpSpPr/>
+        <p:nvPr/>
+      </p:nvGrpSpPr>
+      <p:grpSpPr>
+        <a:xfrm>
+          <a:off x="0" y="0"/>
+          <a:ext cx="0" cy="0"/>
+          <a:chOff x="0" y="0"/>
+          <a:chExt cx="0" cy="0"/>
+        </a:xfrm>
+      </p:grpSpPr>
+      <p:sp>
+        <p:nvSpPr>
+          <p:cNvPr id="2" name="幻灯片图像占位符 1"/>
+          <p:cNvSpPr>
+            <a:spLocks noGrp="1" noRot="1" noChangeAspect="1"/>
+          </p:cNvSpPr>
+          <p:nvPr>
+            <p:ph type="sldImg"/>
+          </p:nvPr>
+        </p:nvSpPr>
+        <p:spPr/>
+      </p:sp>
+      <p:sp>
+        <p:nvSpPr>
+          <p:cNvPr id="3" name="备注占位符 2"/>
+          <p:cNvSpPr>
+            <a:spLocks noGrp="1"/>
+          </p:cNvSpPr>
+          <p:nvPr>
+            <p:ph type="body" idx="1"/>
+          </p:nvPr>
+        </p:nvSpPr>
+        <p:spPr/>
+        <p:txBody>
+          <a:bodyPr/>
+          <a:lstStyle/>
+          <a:p>
+            <a:r>
+              <a:rPr lang="zh-CN" altLang="en-US" dirty="0" smtClean="0"/>
+              <a:t>处理流式数据，不迭代</a:t>
+            </a:r>
+            <a:endParaRPr lang="en-US" altLang="zh-CN" dirty="0" smtClean="0"/>
+          </a:p>
+          <a:p>
+            <a:endParaRPr lang="zh-CN" altLang="en-US" dirty="0"/>
+          </a:p>
+        </p:txBody>
+      </p:sp>
+      <p:sp>
+        <p:nvSpPr>
+          <p:cNvPr id="4" name="灯片编号占位符 3"/>
+          <p:cNvSpPr>
+            <a:spLocks noGrp="1"/>
+          </p:cNvSpPr>
+          <p:nvPr>
+            <p:ph type="sldNum" sz="quarter" idx="10"/>
+          </p:nvPr>
+        </p:nvSpPr>
+        <p:spPr/>
+        <p:txBody>
+          <a:bodyPr/>
+          <a:lstStyle/>
+          <a:p>
+            <a:pPr>
+              <a:defRPr/>
+            </a:pPr>
+            <a:fld id="{0486AD57-67ED-4140-9F70-67C055736CF8}" type="slidenum">
+              <a:rPr lang="zh-CN" altLang="en-US" smtClean="0"/>
+              <a:pPr>
+                <a:defRPr/>
+              </a:pPr>
+              <a:t>25</a:t>
+            </a:fld>
+            <a:endParaRPr lang="zh-CN" altLang="en-US"/>
+          </a:p>
+        </p:txBody>
+      </p:sp>
+    </p:spTree>
+    <p:extLst>
+      <p:ext uri="{BB962C8B-B14F-4D97-AF65-F5344CB8AC3E}">
+        <p14:creationId xmlns:p14="http://schemas.microsoft.com/office/powerpoint/2010/main" val="912401687"/>
+      </p:ext>
+    </p:extLst>
+  </p:cSld>
+  <p:clrMapOvr>
+    <a:masterClrMapping/>
+  </p:clrMapOvr>
+</p:notes>
+</file>
+
+<file path=ppt/notesSlides/notesSlide9.xml><?xml version="1.0" encoding="utf-8"?>
+<p:notes xmlns:a="http://schemas.openxmlformats.org/drawingml/2006/main" xmlns:r="http://schemas.openxmlformats.org/officeDocument/2006/relationships" xmlns:p="http://schemas.openxmlformats.org/presentationml/2006/main">
+  <p:cSld>
+    <p:spTree>
+      <p:nvGrpSpPr>
+        <p:cNvPr id="1" name=""/>
+        <p:cNvGrpSpPr/>
+        <p:nvPr/>
+      </p:nvGrpSpPr>
+      <p:grpSpPr>
+        <a:xfrm>
+          <a:off x="0" y="0"/>
+          <a:ext cx="0" cy="0"/>
+          <a:chOff x="0" y="0"/>
+          <a:chExt cx="0" cy="0"/>
+        </a:xfrm>
+      </p:grpSpPr>
+      <p:sp>
+        <p:nvSpPr>
+          <p:cNvPr id="2" name="幻灯片图像占位符 1"/>
+          <p:cNvSpPr>
+            <a:spLocks noGrp="1" noRot="1" noChangeAspect="1"/>
+          </p:cNvSpPr>
+          <p:nvPr>
+            <p:ph type="sldImg"/>
+          </p:nvPr>
+        </p:nvSpPr>
+        <p:spPr/>
+      </p:sp>
+      <p:sp>
+        <p:nvSpPr>
+          <p:cNvPr id="3" name="备注占位符 2"/>
+          <p:cNvSpPr>
+            <a:spLocks noGrp="1"/>
+          </p:cNvSpPr>
+          <p:nvPr>
+            <p:ph type="body" idx="1"/>
+          </p:nvPr>
+        </p:nvSpPr>
+        <p:spPr/>
+        <p:txBody>
+          <a:bodyPr/>
+          <a:lstStyle/>
+          <a:p>
+            <a:r>
+              <a:rPr lang="zh-CN" altLang="en-US" dirty="0" smtClean="0"/>
+              <a:t>模型逼近</a:t>
+            </a:r>
+            <a:endParaRPr lang="en-US" altLang="zh-CN" dirty="0" smtClean="0"/>
+          </a:p>
+          <a:p>
+            <a:endParaRPr lang="zh-CN" altLang="en-US" dirty="0"/>
+          </a:p>
+        </p:txBody>
+      </p:sp>
+      <p:sp>
+        <p:nvSpPr>
+          <p:cNvPr id="4" name="灯片编号占位符 3"/>
+          <p:cNvSpPr>
+            <a:spLocks noGrp="1"/>
+          </p:cNvSpPr>
+          <p:nvPr>
+            <p:ph type="sldNum" sz="quarter" idx="10"/>
+          </p:nvPr>
+        </p:nvSpPr>
+        <p:spPr/>
+        <p:txBody>
+          <a:bodyPr/>
+          <a:lstStyle/>
+          <a:p>
+            <a:pPr>
+              <a:defRPr/>
+            </a:pPr>
+            <a:fld id="{0486AD57-67ED-4140-9F70-67C055736CF8}" type="slidenum">
+              <a:rPr lang="zh-CN" altLang="en-US" smtClean="0"/>
+              <a:pPr>
+                <a:defRPr/>
+              </a:pPr>
+              <a:t>27</a:t>
+            </a:fld>
+            <a:endParaRPr lang="zh-CN" altLang="en-US"/>
+          </a:p>
+        </p:txBody>
+      </p:sp>
+    </p:spTree>
+    <p:extLst>
+      <p:ext uri="{BB962C8B-B14F-4D97-AF65-F5344CB8AC3E}">
+        <p14:creationId xmlns:p14="http://schemas.microsoft.com/office/powerpoint/2010/main" val="3050283342"/>
       </p:ext>
     </p:extLst>
   </p:cSld>
@@ -9452,7 +10712,7 @@
           <p:nvPr/>
         </p:nvPicPr>
         <p:blipFill>
-          <a:blip r:embed="rId2">
+          <a:blip r:embed="rId3">
             <a:extLst>
               <a:ext uri="{28A0092B-C50C-407E-A947-70E740481C1C}">
                 <a14:useLocalDpi xmlns:a14="http://schemas.microsoft.com/office/drawing/2010/main" val="0"/>
@@ -9568,7 +10828,7 @@
           <p:nvPr/>
         </p:nvPicPr>
         <p:blipFill>
-          <a:blip r:embed="rId3">
+          <a:blip r:embed="rId4">
             <a:extLst>
               <a:ext uri="{28A0092B-C50C-407E-A947-70E740481C1C}">
                 <a14:useLocalDpi xmlns:a14="http://schemas.microsoft.com/office/drawing/2010/main" val="0"/>
@@ -9632,7 +10892,7 @@
           <p:nvPr/>
         </p:nvPicPr>
         <p:blipFill>
-          <a:blip r:embed="rId4">
+          <a:blip r:embed="rId5">
             <a:extLst>
               <a:ext uri="{28A0092B-C50C-407E-A947-70E740481C1C}">
                 <a14:useLocalDpi xmlns:a14="http://schemas.microsoft.com/office/drawing/2010/main" val="0"/>
@@ -12509,7 +13769,7 @@
           <p:nvPr/>
         </p:nvPicPr>
         <p:blipFill>
-          <a:blip r:embed="rId2"/>
+          <a:blip r:embed="rId3"/>
           <a:srcRect/>
           <a:stretch>
             <a:fillRect/>
@@ -12964,12 +14224,12 @@
           <a:graphicData uri="http://schemas.openxmlformats.org/presentationml/2006/ole">
             <mc:AlternateContent xmlns:mc="http://schemas.openxmlformats.org/markup-compatibility/2006">
               <mc:Choice xmlns:v="urn:schemas-microsoft-com:vml" Requires="v">
-                <p:oleObj spid="_x0000_s223457" name="Equation" r:id="rId3" imgW="2247840" imgH="457200" progId="Equation.KSEE3">
+                <p:oleObj spid="_x0000_s223480" name="Equation" r:id="rId4" imgW="2247840" imgH="457200" progId="Equation.KSEE3">
                   <p:embed/>
                 </p:oleObj>
               </mc:Choice>
               <mc:Fallback>
-                <p:oleObj name="Equation" r:id="rId3" imgW="2247840" imgH="457200" progId="Equation.KSEE3">
+                <p:oleObj name="Equation" r:id="rId4" imgW="2247840" imgH="457200" progId="Equation.KSEE3">
                   <p:embed/>
                   <p:pic>
                     <p:nvPicPr>
@@ -12980,7 +14240,7 @@
                       <p:nvPr/>
                     </p:nvPicPr>
                     <p:blipFill>
-                      <a:blip r:embed="rId4">
+                      <a:blip r:embed="rId5">
                         <a:extLst>
                           <a:ext uri="{28A0092B-C50C-407E-A947-70E740481C1C}">
                             <a14:useLocalDpi xmlns:a14="http://schemas.microsoft.com/office/drawing/2010/main" val="0"/>
@@ -16713,7 +17973,7 @@
           <p:nvPr/>
         </p:nvPicPr>
         <p:blipFill>
-          <a:blip r:embed="rId5"/>
+          <a:blip r:embed="rId6"/>
           <a:srcRect/>
           <a:stretch>
             <a:fillRect/>
@@ -17319,12 +18579,12 @@
           <a:graphicData uri="http://schemas.openxmlformats.org/presentationml/2006/ole">
             <mc:AlternateContent xmlns:mc="http://schemas.openxmlformats.org/markup-compatibility/2006">
               <mc:Choice xmlns:v="urn:schemas-microsoft-com:vml" Requires="v">
-                <p:oleObj spid="_x0000_s249056" name="Equation" r:id="rId3" imgW="1346040" imgH="419040" progId="Equation.KSEE3">
+                <p:oleObj spid="_x0000_s249079" name="Equation" r:id="rId4" imgW="1346040" imgH="419040" progId="Equation.KSEE3">
                   <p:embed/>
                 </p:oleObj>
               </mc:Choice>
               <mc:Fallback>
-                <p:oleObj name="Equation" r:id="rId3" imgW="1346040" imgH="419040" progId="Equation.KSEE3">
+                <p:oleObj name="Equation" r:id="rId4" imgW="1346040" imgH="419040" progId="Equation.KSEE3">
                   <p:embed/>
                   <p:pic>
                     <p:nvPicPr>
@@ -17335,7 +18595,7 @@
                       <p:nvPr/>
                     </p:nvPicPr>
                     <p:blipFill>
-                      <a:blip r:embed="rId4">
+                      <a:blip r:embed="rId5">
                         <a:extLst>
                           <a:ext uri="{28A0092B-C50C-407E-A947-70E740481C1C}">
                             <a14:useLocalDpi xmlns:a14="http://schemas.microsoft.com/office/drawing/2010/main" val="0"/>
@@ -17466,7 +18726,7 @@
           <p:nvPr/>
         </p:nvPicPr>
         <p:blipFill>
-          <a:blip r:embed="rId2"/>
+          <a:blip r:embed="rId3"/>
           <a:srcRect l="8333" t="4167" r="6250" b="5556"/>
           <a:stretch>
             <a:fillRect/>
@@ -17499,7 +18759,7 @@
           <p:nvPr/>
         </p:nvPicPr>
         <p:blipFill>
-          <a:blip r:embed="rId3"/>
+          <a:blip r:embed="rId4"/>
           <a:srcRect l="7979" t="4255" r="7447"/>
           <a:stretch>
             <a:fillRect/>
@@ -17977,7 +19237,7 @@
           <p:nvPr/>
         </p:nvPicPr>
         <p:blipFill>
-          <a:blip r:embed="rId2"/>
+          <a:blip r:embed="rId3"/>
           <a:srcRect/>
           <a:stretch>
             <a:fillRect/>
@@ -20580,7 +21840,7 @@
           <p:nvPr/>
         </p:nvPicPr>
         <p:blipFill>
-          <a:blip r:embed="rId2"/>
+          <a:blip r:embed="rId3"/>
           <a:srcRect/>
           <a:stretch>
             <a:fillRect/>
@@ -20718,8 +21978,16 @@
           </a:p>
           <a:p>
             <a:r>
+              <a:rPr lang="en-AU" sz="1600" dirty="0" smtClean="0">
+                <a:solidFill>
+                  <a:srgbClr val="FF0000"/>
+                </a:solidFill>
+              </a:rPr>
+              <a:t>No need </a:t>
+            </a:r>
+            <a:r>
               <a:rPr lang="en-AU" sz="1600" dirty="0" smtClean="0"/>
-              <a:t>No need to specify K in advance.</a:t>
+              <a:t>to specify K in advance.</a:t>
             </a:r>
             <a:endParaRPr lang="en-US" sz="1600" dirty="0" smtClean="0"/>
           </a:p>
@@ -20729,7 +21997,19 @@
           <a:p>
             <a:r>
               <a:rPr lang="en-US" sz="1600" dirty="0" smtClean="0"/>
-              <a:t>Choose a cluster threshold value.</a:t>
+              <a:t>Choose a cluster </a:t>
+            </a:r>
+            <a:r>
+              <a:rPr lang="en-US" sz="1600" dirty="0" smtClean="0">
+                <a:solidFill>
+                  <a:srgbClr val="FF0000"/>
+                </a:solidFill>
+              </a:rPr>
+              <a:t>threshold</a:t>
+            </a:r>
+            <a:r>
+              <a:rPr lang="en-US" sz="1600" dirty="0" smtClean="0"/>
+              <a:t> value.</a:t>
             </a:r>
           </a:p>
           <a:p>
@@ -20845,7 +22125,7 @@
           <p:nvPr/>
         </p:nvPicPr>
         <p:blipFill rotWithShape="1">
-          <a:blip r:embed="rId2">
+          <a:blip r:embed="rId3">
             <a:extLst>
               <a:ext uri="{28A0092B-C50C-407E-A947-70E740481C1C}">
                 <a14:useLocalDpi xmlns:a14="http://schemas.microsoft.com/office/drawing/2010/main" val="0"/>
@@ -21651,12 +22931,12 @@
           <a:graphicData uri="http://schemas.openxmlformats.org/presentationml/2006/ole">
             <mc:AlternateContent xmlns:mc="http://schemas.openxmlformats.org/markup-compatibility/2006">
               <mc:Choice xmlns:v="urn:schemas-microsoft-com:vml" Requires="v">
-                <p:oleObj spid="_x0000_s275903" name="Equation" r:id="rId3" imgW="1968480" imgH="431640" progId="Equation.KSEE3">
+                <p:oleObj spid="_x0000_s275951" name="Equation" r:id="rId4" imgW="1968480" imgH="431640" progId="Equation.KSEE3">
                   <p:embed/>
                 </p:oleObj>
               </mc:Choice>
               <mc:Fallback>
-                <p:oleObj name="Equation" r:id="rId3" imgW="1968480" imgH="431640" progId="Equation.KSEE3">
+                <p:oleObj name="Equation" r:id="rId4" imgW="1968480" imgH="431640" progId="Equation.KSEE3">
                   <p:embed/>
                   <p:pic>
                     <p:nvPicPr>
@@ -21667,7 +22947,7 @@
                       <p:nvPr/>
                     </p:nvPicPr>
                     <p:blipFill>
-                      <a:blip r:embed="rId4">
+                      <a:blip r:embed="rId5">
                         <a:extLst>
                           <a:ext uri="{28A0092B-C50C-407E-A947-70E740481C1C}">
                             <a14:useLocalDpi xmlns:a14="http://schemas.microsoft.com/office/drawing/2010/main" val="0"/>
@@ -21721,12 +23001,12 @@
           <a:graphicData uri="http://schemas.openxmlformats.org/presentationml/2006/ole">
             <mc:AlternateContent xmlns:mc="http://schemas.openxmlformats.org/markup-compatibility/2006">
               <mc:Choice xmlns:v="urn:schemas-microsoft-com:vml" Requires="v">
-                <p:oleObj spid="_x0000_s275904" name="Equation" r:id="rId5" imgW="2616120" imgH="431640" progId="Equation.KSEE3">
+                <p:oleObj spid="_x0000_s275952" name="Equation" r:id="rId6" imgW="2616120" imgH="431640" progId="Equation.KSEE3">
                   <p:embed/>
                 </p:oleObj>
               </mc:Choice>
               <mc:Fallback>
-                <p:oleObj name="Equation" r:id="rId5" imgW="2616120" imgH="431640" progId="Equation.KSEE3">
+                <p:oleObj name="Equation" r:id="rId6" imgW="2616120" imgH="431640" progId="Equation.KSEE3">
                   <p:embed/>
                   <p:pic>
                     <p:nvPicPr>
@@ -21737,7 +23017,7 @@
                       <p:nvPr/>
                     </p:nvPicPr>
                     <p:blipFill>
-                      <a:blip r:embed="rId6">
+                      <a:blip r:embed="rId7">
                         <a:extLst>
                           <a:ext uri="{28A0092B-C50C-407E-A947-70E740481C1C}">
                             <a14:useLocalDpi xmlns:a14="http://schemas.microsoft.com/office/drawing/2010/main" val="0"/>
@@ -21784,7 +23064,7 @@
           <p:nvPr/>
         </p:nvPicPr>
         <p:blipFill>
-          <a:blip r:embed="rId7"/>
+          <a:blip r:embed="rId8"/>
           <a:srcRect/>
           <a:stretch>
             <a:fillRect/>
@@ -21810,7 +23090,7 @@
           <p:nvPr/>
         </p:nvPicPr>
         <p:blipFill>
-          <a:blip r:embed="rId8"/>
+          <a:blip r:embed="rId9"/>
           <a:srcRect/>
           <a:stretch>
             <a:fillRect/>
@@ -22030,7 +23310,7 @@
           <p:nvPr/>
         </p:nvPicPr>
         <p:blipFill>
-          <a:blip r:embed="rId2">
+          <a:blip r:embed="rId3">
             <a:extLst>
               <a:ext uri="{28A0092B-C50C-407E-A947-70E740481C1C}">
                 <a14:useLocalDpi xmlns:a14="http://schemas.microsoft.com/office/drawing/2010/main" val="0"/>
@@ -22132,7 +23412,7 @@
                         <m:dPr>
                           <m:ctrlPr>
                             <a:rPr lang="en-US" altLang="zh-CN" b="0" i="1" smtClean="0">
-                              <a:latin typeface="Cambria Math"/>
+                              <a:latin typeface="Cambria Math" panose="02040503050406030204" pitchFamily="18" charset="0"/>
                             </a:rPr>
                           </m:ctrlPr>
                         </m:dPr>
@@ -22141,7 +23421,7 @@
                             <m:sSubPr>
                               <m:ctrlPr>
                                 <a:rPr lang="en-US" altLang="zh-CN" b="0" i="1" smtClean="0">
-                                  <a:latin typeface="Cambria Math"/>
+                                  <a:latin typeface="Cambria Math" panose="02040503050406030204" pitchFamily="18" charset="0"/>
                                 </a:rPr>
                               </m:ctrlPr>
                             </m:sSubPr>
@@ -22172,7 +23452,7 @@
                             <m:sSubPr>
                               <m:ctrlPr>
                                 <a:rPr lang="en-US" altLang="zh-CN" b="0" i="1" smtClean="0">
-                                  <a:latin typeface="Cambria Math"/>
+                                  <a:latin typeface="Cambria Math" panose="02040503050406030204" pitchFamily="18" charset="0"/>
                                 </a:rPr>
                               </m:ctrlPr>
                             </m:sSubPr>
@@ -22211,7 +23491,7 @@
                         <m:sSubPr>
                           <m:ctrlPr>
                             <a:rPr lang="en-US" altLang="zh-CN" i="1">
-                              <a:latin typeface="Cambria Math"/>
+                              <a:latin typeface="Cambria Math" panose="02040503050406030204" pitchFamily="18" charset="0"/>
                             </a:rPr>
                           </m:ctrlPr>
                         </m:sSubPr>
@@ -22242,7 +23522,7 @@
                         <m:sSubPr>
                           <m:ctrlPr>
                             <a:rPr lang="en-US" altLang="zh-CN" i="1">
-                              <a:latin typeface="Cambria Math"/>
+                              <a:latin typeface="Cambria Math" panose="02040503050406030204" pitchFamily="18" charset="0"/>
                             </a:rPr>
                           </m:ctrlPr>
                         </m:sSubPr>
@@ -22295,7 +23575,7 @@
                 <a:avLst/>
               </a:prstGeom>
               <a:blipFill rotWithShape="1">
-                <a:blip r:embed="rId3"/>
+                <a:blip r:embed="rId4"/>
                 <a:stretch>
                   <a:fillRect b="-16393"/>
                 </a:stretch>
@@ -22363,7 +23643,7 @@
                         <m:sSubPr>
                           <m:ctrlPr>
                             <a:rPr lang="en-US" altLang="zh-CN" b="0" i="1" smtClean="0">
-                              <a:latin typeface="Cambria Math"/>
+                              <a:latin typeface="Cambria Math" panose="02040503050406030204" pitchFamily="18" charset="0"/>
                             </a:rPr>
                           </m:ctrlPr>
                         </m:sSubPr>
@@ -22394,7 +23674,7 @@
                         <m:sSubPr>
                           <m:ctrlPr>
                             <a:rPr lang="en-US" altLang="zh-CN" i="1" smtClean="0">
-                              <a:latin typeface="Cambria Math"/>
+                              <a:latin typeface="Cambria Math" panose="02040503050406030204" pitchFamily="18" charset="0"/>
                             </a:rPr>
                           </m:ctrlPr>
                         </m:sSubPr>
@@ -22453,7 +23733,7 @@
                 <a:avLst/>
               </a:prstGeom>
               <a:blipFill rotWithShape="1">
-                <a:blip r:embed="rId4"/>
+                <a:blip r:embed="rId5"/>
                 <a:stretch>
                   <a:fillRect b="-16393"/>
                 </a:stretch>
@@ -23828,7 +25108,7 @@
                         <m:dPr>
                           <m:ctrlPr>
                             <a:rPr lang="en-US" altLang="zh-CN" b="0" i="1" smtClean="0">
-                              <a:latin typeface="Cambria Math"/>
+                              <a:latin typeface="Cambria Math" panose="02040503050406030204" pitchFamily="18" charset="0"/>
                             </a:rPr>
                           </m:ctrlPr>
                         </m:dPr>
@@ -23859,7 +25139,7 @@
                         <m:fPr>
                           <m:ctrlPr>
                             <a:rPr lang="en-US" altLang="zh-CN" b="0" i="1" smtClean="0">
-                              <a:latin typeface="Cambria Math"/>
+                              <a:latin typeface="Cambria Math" panose="02040503050406030204" pitchFamily="18" charset="0"/>
                             </a:rPr>
                           </m:ctrlPr>
                         </m:fPr>
@@ -23874,7 +25154,7 @@
                             <m:dPr>
                               <m:ctrlPr>
                                 <a:rPr lang="en-US" altLang="zh-CN" b="0" i="1" smtClean="0">
-                                  <a:latin typeface="Cambria Math"/>
+                                  <a:latin typeface="Cambria Math" panose="02040503050406030204" pitchFamily="18" charset="0"/>
                                 </a:rPr>
                               </m:ctrlPr>
                             </m:dPr>
@@ -24183,12 +25463,12 @@
           <a:graphicData uri="http://schemas.openxmlformats.org/presentationml/2006/ole">
             <mc:AlternateContent xmlns:mc="http://schemas.openxmlformats.org/markup-compatibility/2006">
               <mc:Choice xmlns:v="urn:schemas-microsoft-com:vml" Requires="v">
-                <p:oleObj spid="_x0000_s286809" name="Equation" r:id="rId3" imgW="3429000" imgH="685800" progId="Equation.KSEE3">
+                <p:oleObj spid="_x0000_s286924" name="Equation" r:id="rId4" imgW="3429000" imgH="685800" progId="Equation.KSEE3">
                   <p:embed/>
                 </p:oleObj>
               </mc:Choice>
               <mc:Fallback>
-                <p:oleObj name="Equation" r:id="rId3" imgW="3429000" imgH="685800" progId="Equation.KSEE3">
+                <p:oleObj name="Equation" r:id="rId4" imgW="3429000" imgH="685800" progId="Equation.KSEE3">
                   <p:embed/>
                   <p:pic>
                     <p:nvPicPr>
@@ -24199,7 +25479,7 @@
                       <p:nvPr/>
                     </p:nvPicPr>
                     <p:blipFill>
-                      <a:blip r:embed="rId4">
+                      <a:blip r:embed="rId5">
                         <a:extLst>
                           <a:ext uri="{28A0092B-C50C-407E-A947-70E740481C1C}">
                             <a14:useLocalDpi xmlns:a14="http://schemas.microsoft.com/office/drawing/2010/main" val="0"/>
@@ -24253,12 +25533,12 @@
           <a:graphicData uri="http://schemas.openxmlformats.org/presentationml/2006/ole">
             <mc:AlternateContent xmlns:mc="http://schemas.openxmlformats.org/markup-compatibility/2006">
               <mc:Choice xmlns:v="urn:schemas-microsoft-com:vml" Requires="v">
-                <p:oleObj spid="_x0000_s286810" name="Equation" r:id="rId5" imgW="914400" imgH="215640" progId="Equation.KSEE3">
+                <p:oleObj spid="_x0000_s286925" name="Equation" r:id="rId6" imgW="914400" imgH="215640" progId="Equation.KSEE3">
                   <p:embed/>
                 </p:oleObj>
               </mc:Choice>
               <mc:Fallback>
-                <p:oleObj name="Equation" r:id="rId5" imgW="914400" imgH="215640" progId="Equation.KSEE3">
+                <p:oleObj name="Equation" r:id="rId6" imgW="914400" imgH="215640" progId="Equation.KSEE3">
                   <p:embed/>
                   <p:pic>
                     <p:nvPicPr>
@@ -24269,7 +25549,7 @@
                       <p:nvPr/>
                     </p:nvPicPr>
                     <p:blipFill>
-                      <a:blip r:embed="rId6">
+                      <a:blip r:embed="rId7">
                         <a:extLst>
                           <a:ext uri="{28A0092B-C50C-407E-A947-70E740481C1C}">
                             <a14:useLocalDpi xmlns:a14="http://schemas.microsoft.com/office/drawing/2010/main" val="0"/>
@@ -24323,12 +25603,12 @@
           <a:graphicData uri="http://schemas.openxmlformats.org/presentationml/2006/ole">
             <mc:AlternateContent xmlns:mc="http://schemas.openxmlformats.org/markup-compatibility/2006">
               <mc:Choice xmlns:v="urn:schemas-microsoft-com:vml" Requires="v">
-                <p:oleObj spid="_x0000_s286811" name="Equation" r:id="rId7" imgW="3149280" imgH="799920" progId="Equation.KSEE3">
+                <p:oleObj spid="_x0000_s286926" name="Equation" r:id="rId8" imgW="3149280" imgH="799920" progId="Equation.KSEE3">
                   <p:embed/>
                 </p:oleObj>
               </mc:Choice>
               <mc:Fallback>
-                <p:oleObj name="Equation" r:id="rId7" imgW="3149280" imgH="799920" progId="Equation.KSEE3">
+                <p:oleObj name="Equation" r:id="rId8" imgW="3149280" imgH="799920" progId="Equation.KSEE3">
                   <p:embed/>
                   <p:pic>
                     <p:nvPicPr>
@@ -24339,7 +25619,7 @@
                       <p:nvPr/>
                     </p:nvPicPr>
                     <p:blipFill>
-                      <a:blip r:embed="rId8">
+                      <a:blip r:embed="rId9">
                         <a:extLst>
                           <a:ext uri="{28A0092B-C50C-407E-A947-70E740481C1C}">
                             <a14:useLocalDpi xmlns:a14="http://schemas.microsoft.com/office/drawing/2010/main" val="0"/>
@@ -24393,12 +25673,12 @@
           <a:graphicData uri="http://schemas.openxmlformats.org/presentationml/2006/ole">
             <mc:AlternateContent xmlns:mc="http://schemas.openxmlformats.org/markup-compatibility/2006">
               <mc:Choice xmlns:v="urn:schemas-microsoft-com:vml" Requires="v">
-                <p:oleObj spid="_x0000_s286812" name="Equation" r:id="rId9" imgW="1091880" imgH="838080" progId="Equation.KSEE3">
+                <p:oleObj spid="_x0000_s286927" name="Equation" r:id="rId10" imgW="1091880" imgH="838080" progId="Equation.KSEE3">
                   <p:embed/>
                 </p:oleObj>
               </mc:Choice>
               <mc:Fallback>
-                <p:oleObj name="Equation" r:id="rId9" imgW="1091880" imgH="838080" progId="Equation.KSEE3">
+                <p:oleObj name="Equation" r:id="rId10" imgW="1091880" imgH="838080" progId="Equation.KSEE3">
                   <p:embed/>
                   <p:pic>
                     <p:nvPicPr>
@@ -24409,7 +25689,7 @@
                       <p:nvPr/>
                     </p:nvPicPr>
                     <p:blipFill>
-                      <a:blip r:embed="rId10">
+                      <a:blip r:embed="rId11">
                         <a:extLst>
                           <a:ext uri="{28A0092B-C50C-407E-A947-70E740481C1C}">
                             <a14:useLocalDpi xmlns:a14="http://schemas.microsoft.com/office/drawing/2010/main" val="0"/>
@@ -24463,12 +25743,12 @@
           <a:graphicData uri="http://schemas.openxmlformats.org/presentationml/2006/ole">
             <mc:AlternateContent xmlns:mc="http://schemas.openxmlformats.org/markup-compatibility/2006">
               <mc:Choice xmlns:v="urn:schemas-microsoft-com:vml" Requires="v">
-                <p:oleObj spid="_x0000_s286813" name="Equation" r:id="rId11" imgW="1091880" imgH="431640" progId="Equation.KSEE3">
+                <p:oleObj spid="_x0000_s286928" name="Equation" r:id="rId12" imgW="1091880" imgH="431640" progId="Equation.KSEE3">
                   <p:embed/>
                 </p:oleObj>
               </mc:Choice>
               <mc:Fallback>
-                <p:oleObj name="Equation" r:id="rId11" imgW="1091880" imgH="431640" progId="Equation.KSEE3">
+                <p:oleObj name="Equation" r:id="rId12" imgW="1091880" imgH="431640" progId="Equation.KSEE3">
                   <p:embed/>
                   <p:pic>
                     <p:nvPicPr>
@@ -24479,7 +25759,7 @@
                       <p:nvPr/>
                     </p:nvPicPr>
                     <p:blipFill>
-                      <a:blip r:embed="rId12">
+                      <a:blip r:embed="rId13">
                         <a:extLst>
                           <a:ext uri="{28A0092B-C50C-407E-A947-70E740481C1C}">
                             <a14:useLocalDpi xmlns:a14="http://schemas.microsoft.com/office/drawing/2010/main" val="0"/>
@@ -30969,13 +32249,55 @@
                 <a:tableStyleId>{D27102A9-8310-4765-A935-A1911B00CA55}</a:tableStyleId>
               </a:tblPr>
               <a:tblGrid>
-                <a:gridCol w="511629"/>
-                <a:gridCol w="511629"/>
-                <a:gridCol w="511629"/>
-                <a:gridCol w="511629"/>
-                <a:gridCol w="511629"/>
-                <a:gridCol w="511629"/>
-                <a:gridCol w="511629"/>
+                <a:gridCol w="511629">
+                  <a:extLst>
+                    <a:ext uri="{9D8B030D-6E8A-4147-A177-3AD203B41FA5}">
+                      <a16:colId xmlns:a16="http://schemas.microsoft.com/office/drawing/2014/main" val="20000"/>
+                    </a:ext>
+                  </a:extLst>
+                </a:gridCol>
+                <a:gridCol w="511629">
+                  <a:extLst>
+                    <a:ext uri="{9D8B030D-6E8A-4147-A177-3AD203B41FA5}">
+                      <a16:colId xmlns:a16="http://schemas.microsoft.com/office/drawing/2014/main" val="20001"/>
+                    </a:ext>
+                  </a:extLst>
+                </a:gridCol>
+                <a:gridCol w="511629">
+                  <a:extLst>
+                    <a:ext uri="{9D8B030D-6E8A-4147-A177-3AD203B41FA5}">
+                      <a16:colId xmlns:a16="http://schemas.microsoft.com/office/drawing/2014/main" val="20002"/>
+                    </a:ext>
+                  </a:extLst>
+                </a:gridCol>
+                <a:gridCol w="511629">
+                  <a:extLst>
+                    <a:ext uri="{9D8B030D-6E8A-4147-A177-3AD203B41FA5}">
+                      <a16:colId xmlns:a16="http://schemas.microsoft.com/office/drawing/2014/main" val="20003"/>
+                    </a:ext>
+                  </a:extLst>
+                </a:gridCol>
+                <a:gridCol w="511629">
+                  <a:extLst>
+                    <a:ext uri="{9D8B030D-6E8A-4147-A177-3AD203B41FA5}">
+                      <a16:colId xmlns:a16="http://schemas.microsoft.com/office/drawing/2014/main" val="20004"/>
+                    </a:ext>
+                  </a:extLst>
+                </a:gridCol>
+                <a:gridCol w="511629">
+                  <a:extLst>
+                    <a:ext uri="{9D8B030D-6E8A-4147-A177-3AD203B41FA5}">
+                      <a16:colId xmlns:a16="http://schemas.microsoft.com/office/drawing/2014/main" val="20005"/>
+                    </a:ext>
+                  </a:extLst>
+                </a:gridCol>
+                <a:gridCol w="511629">
+                  <a:extLst>
+                    <a:ext uri="{9D8B030D-6E8A-4147-A177-3AD203B41FA5}">
+                      <a16:colId xmlns:a16="http://schemas.microsoft.com/office/drawing/2014/main" val="20006"/>
+                    </a:ext>
+                  </a:extLst>
+                </a:gridCol>
               </a:tblGrid>
               <a:tr h="461749">
                 <a:tc>
@@ -31076,6 +32398,11 @@
                   </a:txBody>
                   <a:tcPr marL="60657" marR="60657" marT="30328" marB="30328" anchor="ctr"/>
                 </a:tc>
+                <a:extLst>
+                  <a:ext uri="{0D108BD9-81ED-4DB2-BD59-A6C34878D82A}">
+                    <a16:rowId xmlns:a16="http://schemas.microsoft.com/office/drawing/2014/main" val="10000"/>
+                  </a:ext>
+                </a:extLst>
               </a:tr>
               <a:tr h="659642">
                 <a:tc>
@@ -31176,6 +32503,11 @@
                   </a:txBody>
                   <a:tcPr marL="60657" marR="60657" marT="30328" marB="30328" anchor="ctr"/>
                 </a:tc>
+                <a:extLst>
+                  <a:ext uri="{0D108BD9-81ED-4DB2-BD59-A6C34878D82A}">
+                    <a16:rowId xmlns:a16="http://schemas.microsoft.com/office/drawing/2014/main" val="10001"/>
+                  </a:ext>
+                </a:extLst>
               </a:tr>
               <a:tr h="659642">
                 <a:tc>
@@ -31276,6 +32608,11 @@
                   </a:txBody>
                   <a:tcPr marL="60657" marR="60657" marT="30328" marB="30328" anchor="ctr"/>
                 </a:tc>
+                <a:extLst>
+                  <a:ext uri="{0D108BD9-81ED-4DB2-BD59-A6C34878D82A}">
+                    <a16:rowId xmlns:a16="http://schemas.microsoft.com/office/drawing/2014/main" val="10002"/>
+                  </a:ext>
+                </a:extLst>
               </a:tr>
               <a:tr h="659642">
                 <a:tc>
@@ -31376,6 +32713,11 @@
                   </a:txBody>
                   <a:tcPr marL="60657" marR="60657" marT="30328" marB="30328" anchor="ctr"/>
                 </a:tc>
+                <a:extLst>
+                  <a:ext uri="{0D108BD9-81ED-4DB2-BD59-A6C34878D82A}">
+                    <a16:rowId xmlns:a16="http://schemas.microsoft.com/office/drawing/2014/main" val="10003"/>
+                  </a:ext>
+                </a:extLst>
               </a:tr>
               <a:tr h="659642">
                 <a:tc>
@@ -31476,6 +32818,11 @@
                   </a:txBody>
                   <a:tcPr marL="60657" marR="60657" marT="30328" marB="30328" anchor="ctr"/>
                 </a:tc>
+                <a:extLst>
+                  <a:ext uri="{0D108BD9-81ED-4DB2-BD59-A6C34878D82A}">
+                    <a16:rowId xmlns:a16="http://schemas.microsoft.com/office/drawing/2014/main" val="10004"/>
+                  </a:ext>
+                </a:extLst>
               </a:tr>
               <a:tr h="659642">
                 <a:tc>
@@ -31576,6 +32923,11 @@
                   </a:txBody>
                   <a:tcPr marL="60657" marR="60657" marT="30328" marB="30328" anchor="ctr"/>
                 </a:tc>
+                <a:extLst>
+                  <a:ext uri="{0D108BD9-81ED-4DB2-BD59-A6C34878D82A}">
+                    <a16:rowId xmlns:a16="http://schemas.microsoft.com/office/drawing/2014/main" val="10005"/>
+                  </a:ext>
+                </a:extLst>
               </a:tr>
               <a:tr h="659642">
                 <a:tc>
@@ -31680,6 +33032,11 @@
                   </a:txBody>
                   <a:tcPr marL="60657" marR="60657" marT="30328" marB="30328" anchor="ctr"/>
                 </a:tc>
+                <a:extLst>
+                  <a:ext uri="{0D108BD9-81ED-4DB2-BD59-A6C34878D82A}">
+                    <a16:rowId xmlns:a16="http://schemas.microsoft.com/office/drawing/2014/main" val="10006"/>
+                  </a:ext>
+                </a:extLst>
               </a:tr>
             </a:tbl>
           </a:graphicData>
@@ -31858,12 +33215,48 @@
                 <a:tableStyleId>{D27102A9-8310-4765-A935-A1911B00CA55}</a:tableStyleId>
               </a:tblPr>
               <a:tblGrid>
-                <a:gridCol w="838200"/>
-                <a:gridCol w="610541"/>
-                <a:gridCol w="685565"/>
-                <a:gridCol w="837494"/>
-                <a:gridCol w="533636"/>
-                <a:gridCol w="685565"/>
+                <a:gridCol w="838200">
+                  <a:extLst>
+                    <a:ext uri="{9D8B030D-6E8A-4147-A177-3AD203B41FA5}">
+                      <a16:colId xmlns:a16="http://schemas.microsoft.com/office/drawing/2014/main" val="20000"/>
+                    </a:ext>
+                  </a:extLst>
+                </a:gridCol>
+                <a:gridCol w="610541">
+                  <a:extLst>
+                    <a:ext uri="{9D8B030D-6E8A-4147-A177-3AD203B41FA5}">
+                      <a16:colId xmlns:a16="http://schemas.microsoft.com/office/drawing/2014/main" val="20001"/>
+                    </a:ext>
+                  </a:extLst>
+                </a:gridCol>
+                <a:gridCol w="685565">
+                  <a:extLst>
+                    <a:ext uri="{9D8B030D-6E8A-4147-A177-3AD203B41FA5}">
+                      <a16:colId xmlns:a16="http://schemas.microsoft.com/office/drawing/2014/main" val="20002"/>
+                    </a:ext>
+                  </a:extLst>
+                </a:gridCol>
+                <a:gridCol w="837494">
+                  <a:extLst>
+                    <a:ext uri="{9D8B030D-6E8A-4147-A177-3AD203B41FA5}">
+                      <a16:colId xmlns:a16="http://schemas.microsoft.com/office/drawing/2014/main" val="20003"/>
+                    </a:ext>
+                  </a:extLst>
+                </a:gridCol>
+                <a:gridCol w="533636">
+                  <a:extLst>
+                    <a:ext uri="{9D8B030D-6E8A-4147-A177-3AD203B41FA5}">
+                      <a16:colId xmlns:a16="http://schemas.microsoft.com/office/drawing/2014/main" val="20004"/>
+                    </a:ext>
+                  </a:extLst>
+                </a:gridCol>
+                <a:gridCol w="685565">
+                  <a:extLst>
+                    <a:ext uri="{9D8B030D-6E8A-4147-A177-3AD203B41FA5}">
+                      <a16:colId xmlns:a16="http://schemas.microsoft.com/office/drawing/2014/main" val="20005"/>
+                    </a:ext>
+                  </a:extLst>
+                </a:gridCol>
               </a:tblGrid>
               <a:tr h="762000">
                 <a:tc>
@@ -31950,6 +33343,11 @@
                   </a:txBody>
                   <a:tcPr marL="56444" marR="56444" marT="28222" marB="28222" anchor="ctr"/>
                 </a:tc>
+                <a:extLst>
+                  <a:ext uri="{0D108BD9-81ED-4DB2-BD59-A6C34878D82A}">
+                    <a16:rowId xmlns:a16="http://schemas.microsoft.com/office/drawing/2014/main" val="10000"/>
+                  </a:ext>
+                </a:extLst>
               </a:tr>
               <a:tr h="609600">
                 <a:tc>
@@ -32036,6 +33434,11 @@
                   </a:txBody>
                   <a:tcPr marL="56444" marR="56444" marT="28222" marB="28222" anchor="ctr"/>
                 </a:tc>
+                <a:extLst>
+                  <a:ext uri="{0D108BD9-81ED-4DB2-BD59-A6C34878D82A}">
+                    <a16:rowId xmlns:a16="http://schemas.microsoft.com/office/drawing/2014/main" val="10001"/>
+                  </a:ext>
+                </a:extLst>
               </a:tr>
               <a:tr h="582277">
                 <a:tc>
@@ -32122,6 +33525,11 @@
                   </a:txBody>
                   <a:tcPr marL="56444" marR="56444" marT="28222" marB="28222" anchor="ctr"/>
                 </a:tc>
+                <a:extLst>
+                  <a:ext uri="{0D108BD9-81ED-4DB2-BD59-A6C34878D82A}">
+                    <a16:rowId xmlns:a16="http://schemas.microsoft.com/office/drawing/2014/main" val="10002"/>
+                  </a:ext>
+                </a:extLst>
               </a:tr>
               <a:tr h="713123">
                 <a:tc>
@@ -32208,6 +33616,11 @@
                   </a:txBody>
                   <a:tcPr marL="56444" marR="56444" marT="28222" marB="28222" anchor="ctr"/>
                 </a:tc>
+                <a:extLst>
+                  <a:ext uri="{0D108BD9-81ED-4DB2-BD59-A6C34878D82A}">
+                    <a16:rowId xmlns:a16="http://schemas.microsoft.com/office/drawing/2014/main" val="10003"/>
+                  </a:ext>
+                </a:extLst>
               </a:tr>
               <a:tr h="471645">
                 <a:tc>
@@ -32294,6 +33707,11 @@
                   </a:txBody>
                   <a:tcPr marL="56444" marR="56444" marT="28222" marB="28222" anchor="ctr"/>
                 </a:tc>
+                <a:extLst>
+                  <a:ext uri="{0D108BD9-81ED-4DB2-BD59-A6C34878D82A}">
+                    <a16:rowId xmlns:a16="http://schemas.microsoft.com/office/drawing/2014/main" val="10004"/>
+                  </a:ext>
+                </a:extLst>
               </a:tr>
               <a:tr h="582277">
                 <a:tc>
@@ -32384,6 +33802,11 @@
                   </a:txBody>
                   <a:tcPr marL="56444" marR="56444" marT="28222" marB="28222" anchor="ctr"/>
                 </a:tc>
+                <a:extLst>
+                  <a:ext uri="{0D108BD9-81ED-4DB2-BD59-A6C34878D82A}">
+                    <a16:rowId xmlns:a16="http://schemas.microsoft.com/office/drawing/2014/main" val="10005"/>
+                  </a:ext>
+                </a:extLst>
               </a:tr>
             </a:tbl>
           </a:graphicData>
@@ -32414,11 +33837,41 @@
                 <a:tableStyleId>{D27102A9-8310-4765-A935-A1911B00CA55}</a:tableStyleId>
               </a:tblPr>
               <a:tblGrid>
-                <a:gridCol w="914400"/>
-                <a:gridCol w="675142"/>
-                <a:gridCol w="794771"/>
-                <a:gridCol w="794771"/>
-                <a:gridCol w="859516"/>
+                <a:gridCol w="914400">
+                  <a:extLst>
+                    <a:ext uri="{9D8B030D-6E8A-4147-A177-3AD203B41FA5}">
+                      <a16:colId xmlns:a16="http://schemas.microsoft.com/office/drawing/2014/main" val="20000"/>
+                    </a:ext>
+                  </a:extLst>
+                </a:gridCol>
+                <a:gridCol w="675142">
+                  <a:extLst>
+                    <a:ext uri="{9D8B030D-6E8A-4147-A177-3AD203B41FA5}">
+                      <a16:colId xmlns:a16="http://schemas.microsoft.com/office/drawing/2014/main" val="20001"/>
+                    </a:ext>
+                  </a:extLst>
+                </a:gridCol>
+                <a:gridCol w="794771">
+                  <a:extLst>
+                    <a:ext uri="{9D8B030D-6E8A-4147-A177-3AD203B41FA5}">
+                      <a16:colId xmlns:a16="http://schemas.microsoft.com/office/drawing/2014/main" val="20002"/>
+                    </a:ext>
+                  </a:extLst>
+                </a:gridCol>
+                <a:gridCol w="794771">
+                  <a:extLst>
+                    <a:ext uri="{9D8B030D-6E8A-4147-A177-3AD203B41FA5}">
+                      <a16:colId xmlns:a16="http://schemas.microsoft.com/office/drawing/2014/main" val="20003"/>
+                    </a:ext>
+                  </a:extLst>
+                </a:gridCol>
+                <a:gridCol w="859516">
+                  <a:extLst>
+                    <a:ext uri="{9D8B030D-6E8A-4147-A177-3AD203B41FA5}">
+                      <a16:colId xmlns:a16="http://schemas.microsoft.com/office/drawing/2014/main" val="20004"/>
+                    </a:ext>
+                  </a:extLst>
+                </a:gridCol>
               </a:tblGrid>
               <a:tr h="522153">
                 <a:tc>
@@ -32491,6 +33944,11 @@
                   </a:txBody>
                   <a:tcPr marL="59765" marR="59765" marT="29882" marB="29882" anchor="ctr"/>
                 </a:tc>
+                <a:extLst>
+                  <a:ext uri="{0D108BD9-81ED-4DB2-BD59-A6C34878D82A}">
+                    <a16:rowId xmlns:a16="http://schemas.microsoft.com/office/drawing/2014/main" val="10000"/>
+                  </a:ext>
+                </a:extLst>
               </a:tr>
               <a:tr h="435399">
                 <a:tc>
@@ -32563,6 +34021,11 @@
                   </a:txBody>
                   <a:tcPr marL="59765" marR="59765" marT="29882" marB="29882" anchor="ctr"/>
                 </a:tc>
+                <a:extLst>
+                  <a:ext uri="{0D108BD9-81ED-4DB2-BD59-A6C34878D82A}">
+                    <a16:rowId xmlns:a16="http://schemas.microsoft.com/office/drawing/2014/main" val="10001"/>
+                  </a:ext>
+                </a:extLst>
               </a:tr>
               <a:tr h="515606">
                 <a:tc>
@@ -32635,6 +34098,11 @@
                   </a:txBody>
                   <a:tcPr marL="59765" marR="59765" marT="29882" marB="29882" anchor="ctr"/>
                 </a:tc>
+                <a:extLst>
+                  <a:ext uri="{0D108BD9-81ED-4DB2-BD59-A6C34878D82A}">
+                    <a16:rowId xmlns:a16="http://schemas.microsoft.com/office/drawing/2014/main" val="10002"/>
+                  </a:ext>
+                </a:extLst>
               </a:tr>
               <a:tr h="519288">
                 <a:tc>
@@ -32707,6 +34175,11 @@
                   </a:txBody>
                   <a:tcPr marL="59765" marR="59765" marT="29882" marB="29882" anchor="ctr"/>
                 </a:tc>
+                <a:extLst>
+                  <a:ext uri="{0D108BD9-81ED-4DB2-BD59-A6C34878D82A}">
+                    <a16:rowId xmlns:a16="http://schemas.microsoft.com/office/drawing/2014/main" val="10003"/>
+                  </a:ext>
+                </a:extLst>
               </a:tr>
               <a:tr h="522153">
                 <a:tc>
@@ -32783,6 +34256,11 @@
                   </a:txBody>
                   <a:tcPr marL="59765" marR="59765" marT="29882" marB="29882" anchor="ctr"/>
                 </a:tc>
+                <a:extLst>
+                  <a:ext uri="{0D108BD9-81ED-4DB2-BD59-A6C34878D82A}">
+                    <a16:rowId xmlns:a16="http://schemas.microsoft.com/office/drawing/2014/main" val="10004"/>
+                  </a:ext>
+                </a:extLst>
               </a:tr>
             </a:tbl>
           </a:graphicData>
@@ -33364,10 +34842,34 @@
                 <a:tableStyleId>{D27102A9-8310-4765-A935-A1911B00CA55}</a:tableStyleId>
               </a:tblPr>
               <a:tblGrid>
-                <a:gridCol w="1371600"/>
-                <a:gridCol w="1447800"/>
-                <a:gridCol w="960120"/>
-                <a:gridCol w="944880"/>
+                <a:gridCol w="1371600">
+                  <a:extLst>
+                    <a:ext uri="{9D8B030D-6E8A-4147-A177-3AD203B41FA5}">
+                      <a16:colId xmlns:a16="http://schemas.microsoft.com/office/drawing/2014/main" val="20000"/>
+                    </a:ext>
+                  </a:extLst>
+                </a:gridCol>
+                <a:gridCol w="1447800">
+                  <a:extLst>
+                    <a:ext uri="{9D8B030D-6E8A-4147-A177-3AD203B41FA5}">
+                      <a16:colId xmlns:a16="http://schemas.microsoft.com/office/drawing/2014/main" val="20001"/>
+                    </a:ext>
+                  </a:extLst>
+                </a:gridCol>
+                <a:gridCol w="960120">
+                  <a:extLst>
+                    <a:ext uri="{9D8B030D-6E8A-4147-A177-3AD203B41FA5}">
+                      <a16:colId xmlns:a16="http://schemas.microsoft.com/office/drawing/2014/main" val="20002"/>
+                    </a:ext>
+                  </a:extLst>
+                </a:gridCol>
+                <a:gridCol w="944880">
+                  <a:extLst>
+                    <a:ext uri="{9D8B030D-6E8A-4147-A177-3AD203B41FA5}">
+                      <a16:colId xmlns:a16="http://schemas.microsoft.com/office/drawing/2014/main" val="20003"/>
+                    </a:ext>
+                  </a:extLst>
+                </a:gridCol>
               </a:tblGrid>
               <a:tr h="507072">
                 <a:tc>
@@ -33426,6 +34928,11 @@
                   </a:txBody>
                   <a:tcPr marL="73891" marR="73891" marT="36945" marB="36945" anchor="ctr"/>
                 </a:tc>
+                <a:extLst>
+                  <a:ext uri="{0D108BD9-81ED-4DB2-BD59-A6C34878D82A}">
+                    <a16:rowId xmlns:a16="http://schemas.microsoft.com/office/drawing/2014/main" val="10000"/>
+                  </a:ext>
+                </a:extLst>
               </a:tr>
               <a:tr h="483527">
                 <a:tc>
@@ -33484,6 +34991,11 @@
                   </a:txBody>
                   <a:tcPr marL="73891" marR="73891" marT="36945" marB="36945" anchor="ctr"/>
                 </a:tc>
+                <a:extLst>
+                  <a:ext uri="{0D108BD9-81ED-4DB2-BD59-A6C34878D82A}">
+                    <a16:rowId xmlns:a16="http://schemas.microsoft.com/office/drawing/2014/main" val="10001"/>
+                  </a:ext>
+                </a:extLst>
               </a:tr>
               <a:tr h="381000">
                 <a:tc>
@@ -33546,6 +35058,11 @@
                   </a:txBody>
                   <a:tcPr marL="73891" marR="73891" marT="36945" marB="36945" anchor="ctr"/>
                 </a:tc>
+                <a:extLst>
+                  <a:ext uri="{0D108BD9-81ED-4DB2-BD59-A6C34878D82A}">
+                    <a16:rowId xmlns:a16="http://schemas.microsoft.com/office/drawing/2014/main" val="10002"/>
+                  </a:ext>
+                </a:extLst>
               </a:tr>
               <a:tr h="459510">
                 <a:tc>
@@ -33604,6 +35121,11 @@
                   </a:txBody>
                   <a:tcPr marL="73891" marR="73891" marT="36945" marB="36945" anchor="ctr"/>
                 </a:tc>
+                <a:extLst>
+                  <a:ext uri="{0D108BD9-81ED-4DB2-BD59-A6C34878D82A}">
+                    <a16:rowId xmlns:a16="http://schemas.microsoft.com/office/drawing/2014/main" val="10003"/>
+                  </a:ext>
+                </a:extLst>
               </a:tr>
             </a:tbl>
           </a:graphicData>
@@ -33634,9 +35156,27 @@
                 <a:tableStyleId>{D27102A9-8310-4765-A935-A1911B00CA55}</a:tableStyleId>
               </a:tblPr>
               <a:tblGrid>
-                <a:gridCol w="1779985"/>
-                <a:gridCol w="1857375"/>
-                <a:gridCol w="1315640"/>
+                <a:gridCol w="1779985">
+                  <a:extLst>
+                    <a:ext uri="{9D8B030D-6E8A-4147-A177-3AD203B41FA5}">
+                      <a16:colId xmlns:a16="http://schemas.microsoft.com/office/drawing/2014/main" val="20000"/>
+                    </a:ext>
+                  </a:extLst>
+                </a:gridCol>
+                <a:gridCol w="1857375">
+                  <a:extLst>
+                    <a:ext uri="{9D8B030D-6E8A-4147-A177-3AD203B41FA5}">
+                      <a16:colId xmlns:a16="http://schemas.microsoft.com/office/drawing/2014/main" val="20001"/>
+                    </a:ext>
+                  </a:extLst>
+                </a:gridCol>
+                <a:gridCol w="1315640">
+                  <a:extLst>
+                    <a:ext uri="{9D8B030D-6E8A-4147-A177-3AD203B41FA5}">
+                      <a16:colId xmlns:a16="http://schemas.microsoft.com/office/drawing/2014/main" val="20002"/>
+                    </a:ext>
+                  </a:extLst>
+                </a:gridCol>
               </a:tblGrid>
               <a:tr h="509875">
                 <a:tc>
@@ -33681,6 +35221,11 @@
                   </a:txBody>
                   <a:tcPr anchor="ctr"/>
                 </a:tc>
+                <a:extLst>
+                  <a:ext uri="{0D108BD9-81ED-4DB2-BD59-A6C34878D82A}">
+                    <a16:rowId xmlns:a16="http://schemas.microsoft.com/office/drawing/2014/main" val="10000"/>
+                  </a:ext>
+                </a:extLst>
               </a:tr>
               <a:tr h="509875">
                 <a:tc>
@@ -33725,6 +35270,11 @@
                   </a:txBody>
                   <a:tcPr anchor="ctr"/>
                 </a:tc>
+                <a:extLst>
+                  <a:ext uri="{0D108BD9-81ED-4DB2-BD59-A6C34878D82A}">
+                    <a16:rowId xmlns:a16="http://schemas.microsoft.com/office/drawing/2014/main" val="10001"/>
+                  </a:ext>
+                </a:extLst>
               </a:tr>
               <a:tr h="351849">
                 <a:tc>
@@ -33769,6 +35319,11 @@
                   </a:txBody>
                   <a:tcPr anchor="ctr"/>
                 </a:tc>
+                <a:extLst>
+                  <a:ext uri="{0D108BD9-81ED-4DB2-BD59-A6C34878D82A}">
+                    <a16:rowId xmlns:a16="http://schemas.microsoft.com/office/drawing/2014/main" val="10002"/>
+                  </a:ext>
+                </a:extLst>
               </a:tr>
             </a:tbl>
           </a:graphicData>
@@ -39491,15 +41046,7 @@
             <a:pPr lvl="1"/>
             <a:r>
               <a:rPr lang="en-AU" altLang="zh-CN" sz="1600" dirty="0" smtClean="0"/>
-              <a:t>Clustering </a:t>
-            </a:r>
-            <a:r>
-              <a:rPr lang="en-AU" altLang="zh-CN" sz="1600" dirty="0" smtClean="0"/>
-              <a:t>microarray </a:t>
-            </a:r>
-            <a:r>
-              <a:rPr lang="en-AU" altLang="zh-CN" sz="1600" dirty="0" smtClean="0"/>
-              <a:t>data, genes and sequences.</a:t>
+              <a:t>Clustering microarray data, genes and sequences.</a:t>
             </a:r>
           </a:p>
           <a:p>

</xml_diff>